<commit_message>
update of beta cutoff for similarity. and a few comments. also fixed a problem with the sliding to find best alignment for when motif1 is shorter than motif2.
</commit_message>
<xml_diff>
--- a/bioinformatics presentation.pptx
+++ b/bioinformatics presentation.pptx
@@ -4,6 +4,9 @@
   <p:sldMasterIdLst>
     <p:sldMasterId id="2147483660" r:id="rId1"/>
   </p:sldMasterIdLst>
+  <p:notesMasterIdLst>
+    <p:notesMasterId r:id="rId11"/>
+  </p:notesMasterIdLst>
   <p:sldIdLst>
     <p:sldId id="256" r:id="rId2"/>
     <p:sldId id="257" r:id="rId3"/>
@@ -12,6 +15,8 @@
     <p:sldId id="262" r:id="rId6"/>
     <p:sldId id="260" r:id="rId7"/>
     <p:sldId id="261" r:id="rId8"/>
+    <p:sldId id="263" r:id="rId9"/>
+    <p:sldId id="264" r:id="rId10"/>
   </p:sldIdLst>
   <p:sldSz cx="9144000" cy="6858000" type="screen4x3"/>
   <p:notesSz cx="6858000" cy="9144000"/>
@@ -113,6 +118,444 @@
 </p:presentation>
 </file>
 
+<file path=ppt/notesMasters/notesMaster1.xml><?xml version="1.0" encoding="utf-8"?>
+<p:notesMaster xmlns:a="http://schemas.openxmlformats.org/drawingml/2006/main" xmlns:r="http://schemas.openxmlformats.org/officeDocument/2006/relationships" xmlns:p="http://schemas.openxmlformats.org/presentationml/2006/main">
+  <p:cSld>
+    <p:bg>
+      <p:bgRef idx="1001">
+        <a:schemeClr val="bg1"/>
+      </p:bgRef>
+    </p:bg>
+    <p:spTree>
+      <p:nvGrpSpPr>
+        <p:cNvPr id="1" name=""/>
+        <p:cNvGrpSpPr/>
+        <p:nvPr/>
+      </p:nvGrpSpPr>
+      <p:grpSpPr>
+        <a:xfrm>
+          <a:off x="0" y="0"/>
+          <a:ext cx="0" cy="0"/>
+          <a:chOff x="0" y="0"/>
+          <a:chExt cx="0" cy="0"/>
+        </a:xfrm>
+      </p:grpSpPr>
+      <p:sp>
+        <p:nvSpPr>
+          <p:cNvPr id="2" name="Header Placeholder 1"/>
+          <p:cNvSpPr>
+            <a:spLocks noGrp="1"/>
+          </p:cNvSpPr>
+          <p:nvPr>
+            <p:ph type="hdr" sz="quarter"/>
+          </p:nvPr>
+        </p:nvSpPr>
+        <p:spPr>
+          <a:xfrm>
+            <a:off x="0" y="0"/>
+            <a:ext cx="2971800" cy="457200"/>
+          </a:xfrm>
+          <a:prstGeom prst="rect">
+            <a:avLst/>
+          </a:prstGeom>
+        </p:spPr>
+        <p:txBody>
+          <a:bodyPr vert="horz" lIns="91440" tIns="45720" rIns="91440" bIns="45720" rtlCol="0"/>
+          <a:lstStyle>
+            <a:lvl1pPr algn="l">
+              <a:defRPr sz="1200"/>
+            </a:lvl1pPr>
+          </a:lstStyle>
+          <a:p>
+            <a:endParaRPr lang="en-US"/>
+          </a:p>
+        </p:txBody>
+      </p:sp>
+      <p:sp>
+        <p:nvSpPr>
+          <p:cNvPr id="3" name="Date Placeholder 2"/>
+          <p:cNvSpPr>
+            <a:spLocks noGrp="1"/>
+          </p:cNvSpPr>
+          <p:nvPr>
+            <p:ph type="dt" idx="1"/>
+          </p:nvPr>
+        </p:nvSpPr>
+        <p:spPr>
+          <a:xfrm>
+            <a:off x="3884613" y="0"/>
+            <a:ext cx="2971800" cy="457200"/>
+          </a:xfrm>
+          <a:prstGeom prst="rect">
+            <a:avLst/>
+          </a:prstGeom>
+        </p:spPr>
+        <p:txBody>
+          <a:bodyPr vert="horz" lIns="91440" tIns="45720" rIns="91440" bIns="45720" rtlCol="0"/>
+          <a:lstStyle>
+            <a:lvl1pPr algn="r">
+              <a:defRPr sz="1200"/>
+            </a:lvl1pPr>
+          </a:lstStyle>
+          <a:p>
+            <a:fld id="{79D92611-7840-41C4-A505-64402AD7E116}" type="datetimeFigureOut">
+              <a:rPr lang="en-US" smtClean="0"/>
+              <a:t>5/10/2011</a:t>
+            </a:fld>
+            <a:endParaRPr lang="en-US"/>
+          </a:p>
+        </p:txBody>
+      </p:sp>
+      <p:sp>
+        <p:nvSpPr>
+          <p:cNvPr id="4" name="Slide Image Placeholder 3"/>
+          <p:cNvSpPr>
+            <a:spLocks noGrp="1" noRot="1" noChangeAspect="1"/>
+          </p:cNvSpPr>
+          <p:nvPr>
+            <p:ph type="sldImg" idx="2"/>
+          </p:nvPr>
+        </p:nvSpPr>
+        <p:spPr>
+          <a:xfrm>
+            <a:off x="1143000" y="685800"/>
+            <a:ext cx="4572000" cy="3429000"/>
+          </a:xfrm>
+          <a:prstGeom prst="rect">
+            <a:avLst/>
+          </a:prstGeom>
+          <a:noFill/>
+          <a:ln w="12700">
+            <a:solidFill>
+              <a:prstClr val="black"/>
+            </a:solidFill>
+          </a:ln>
+        </p:spPr>
+        <p:txBody>
+          <a:bodyPr vert="horz" lIns="91440" tIns="45720" rIns="91440" bIns="45720" rtlCol="0" anchor="ctr"/>
+          <a:lstStyle/>
+          <a:p>
+            <a:endParaRPr lang="en-US"/>
+          </a:p>
+        </p:txBody>
+      </p:sp>
+      <p:sp>
+        <p:nvSpPr>
+          <p:cNvPr id="5" name="Notes Placeholder 4"/>
+          <p:cNvSpPr>
+            <a:spLocks noGrp="1"/>
+          </p:cNvSpPr>
+          <p:nvPr>
+            <p:ph type="body" sz="quarter" idx="3"/>
+          </p:nvPr>
+        </p:nvSpPr>
+        <p:spPr>
+          <a:xfrm>
+            <a:off x="685800" y="4343400"/>
+            <a:ext cx="5486400" cy="4114800"/>
+          </a:xfrm>
+          <a:prstGeom prst="rect">
+            <a:avLst/>
+          </a:prstGeom>
+        </p:spPr>
+        <p:txBody>
+          <a:bodyPr vert="horz" lIns="91440" tIns="45720" rIns="91440" bIns="45720" rtlCol="0"/>
+          <a:lstStyle/>
+          <a:p>
+            <a:pPr lvl="0"/>
+            <a:r>
+              <a:rPr lang="en-US" smtClean="0"/>
+              <a:t>Click to edit Master text styles</a:t>
+            </a:r>
+          </a:p>
+          <a:p>
+            <a:pPr lvl="1"/>
+            <a:r>
+              <a:rPr lang="en-US" smtClean="0"/>
+              <a:t>Second level</a:t>
+            </a:r>
+          </a:p>
+          <a:p>
+            <a:pPr lvl="2"/>
+            <a:r>
+              <a:rPr lang="en-US" smtClean="0"/>
+              <a:t>Third level</a:t>
+            </a:r>
+          </a:p>
+          <a:p>
+            <a:pPr lvl="3"/>
+            <a:r>
+              <a:rPr lang="en-US" smtClean="0"/>
+              <a:t>Fourth level</a:t>
+            </a:r>
+          </a:p>
+          <a:p>
+            <a:pPr lvl="4"/>
+            <a:r>
+              <a:rPr lang="en-US" smtClean="0"/>
+              <a:t>Fifth level</a:t>
+            </a:r>
+            <a:endParaRPr lang="en-US"/>
+          </a:p>
+        </p:txBody>
+      </p:sp>
+      <p:sp>
+        <p:nvSpPr>
+          <p:cNvPr id="6" name="Footer Placeholder 5"/>
+          <p:cNvSpPr>
+            <a:spLocks noGrp="1"/>
+          </p:cNvSpPr>
+          <p:nvPr>
+            <p:ph type="ftr" sz="quarter" idx="4"/>
+          </p:nvPr>
+        </p:nvSpPr>
+        <p:spPr>
+          <a:xfrm>
+            <a:off x="0" y="8685213"/>
+            <a:ext cx="2971800" cy="457200"/>
+          </a:xfrm>
+          <a:prstGeom prst="rect">
+            <a:avLst/>
+          </a:prstGeom>
+        </p:spPr>
+        <p:txBody>
+          <a:bodyPr vert="horz" lIns="91440" tIns="45720" rIns="91440" bIns="45720" rtlCol="0" anchor="b"/>
+          <a:lstStyle>
+            <a:lvl1pPr algn="l">
+              <a:defRPr sz="1200"/>
+            </a:lvl1pPr>
+          </a:lstStyle>
+          <a:p>
+            <a:endParaRPr lang="en-US"/>
+          </a:p>
+        </p:txBody>
+      </p:sp>
+      <p:sp>
+        <p:nvSpPr>
+          <p:cNvPr id="7" name="Slide Number Placeholder 6"/>
+          <p:cNvSpPr>
+            <a:spLocks noGrp="1"/>
+          </p:cNvSpPr>
+          <p:nvPr>
+            <p:ph type="sldNum" sz="quarter" idx="5"/>
+          </p:nvPr>
+        </p:nvSpPr>
+        <p:spPr>
+          <a:xfrm>
+            <a:off x="3884613" y="8685213"/>
+            <a:ext cx="2971800" cy="457200"/>
+          </a:xfrm>
+          <a:prstGeom prst="rect">
+            <a:avLst/>
+          </a:prstGeom>
+        </p:spPr>
+        <p:txBody>
+          <a:bodyPr vert="horz" lIns="91440" tIns="45720" rIns="91440" bIns="45720" rtlCol="0" anchor="b"/>
+          <a:lstStyle>
+            <a:lvl1pPr algn="r">
+              <a:defRPr sz="1200"/>
+            </a:lvl1pPr>
+          </a:lstStyle>
+          <a:p>
+            <a:fld id="{7B7548D5-81C3-4F6E-8F88-55AD18B7E94C}" type="slidenum">
+              <a:rPr lang="en-US" smtClean="0"/>
+              <a:t>‹#›</a:t>
+            </a:fld>
+            <a:endParaRPr lang="en-US"/>
+          </a:p>
+        </p:txBody>
+      </p:sp>
+    </p:spTree>
+    <p:extLst>
+      <p:ext uri="{BB962C8B-B14F-4D97-AF65-F5344CB8AC3E}">
+        <p14:creationId xmlns:p14="http://schemas.microsoft.com/office/powerpoint/2010/main" val="2818104127"/>
+      </p:ext>
+    </p:extLst>
+  </p:cSld>
+  <p:clrMap bg1="lt1" tx1="dk1" bg2="lt2" tx2="dk2" accent1="accent1" accent2="accent2" accent3="accent3" accent4="accent4" accent5="accent5" accent6="accent6" hlink="hlink" folHlink="folHlink"/>
+  <p:notesStyle>
+    <a:lvl1pPr marL="0" algn="l" defTabSz="914400" rtl="0" eaLnBrk="1" latinLnBrk="0" hangingPunct="1">
+      <a:defRPr sz="1200" kern="1200">
+        <a:solidFill>
+          <a:schemeClr val="tx1"/>
+        </a:solidFill>
+        <a:latin typeface="+mn-lt"/>
+        <a:ea typeface="+mn-ea"/>
+        <a:cs typeface="+mn-cs"/>
+      </a:defRPr>
+    </a:lvl1pPr>
+    <a:lvl2pPr marL="457200" algn="l" defTabSz="914400" rtl="0" eaLnBrk="1" latinLnBrk="0" hangingPunct="1">
+      <a:defRPr sz="1200" kern="1200">
+        <a:solidFill>
+          <a:schemeClr val="tx1"/>
+        </a:solidFill>
+        <a:latin typeface="+mn-lt"/>
+        <a:ea typeface="+mn-ea"/>
+        <a:cs typeface="+mn-cs"/>
+      </a:defRPr>
+    </a:lvl2pPr>
+    <a:lvl3pPr marL="914400" algn="l" defTabSz="914400" rtl="0" eaLnBrk="1" latinLnBrk="0" hangingPunct="1">
+      <a:defRPr sz="1200" kern="1200">
+        <a:solidFill>
+          <a:schemeClr val="tx1"/>
+        </a:solidFill>
+        <a:latin typeface="+mn-lt"/>
+        <a:ea typeface="+mn-ea"/>
+        <a:cs typeface="+mn-cs"/>
+      </a:defRPr>
+    </a:lvl3pPr>
+    <a:lvl4pPr marL="1371600" algn="l" defTabSz="914400" rtl="0" eaLnBrk="1" latinLnBrk="0" hangingPunct="1">
+      <a:defRPr sz="1200" kern="1200">
+        <a:solidFill>
+          <a:schemeClr val="tx1"/>
+        </a:solidFill>
+        <a:latin typeface="+mn-lt"/>
+        <a:ea typeface="+mn-ea"/>
+        <a:cs typeface="+mn-cs"/>
+      </a:defRPr>
+    </a:lvl4pPr>
+    <a:lvl5pPr marL="1828800" algn="l" defTabSz="914400" rtl="0" eaLnBrk="1" latinLnBrk="0" hangingPunct="1">
+      <a:defRPr sz="1200" kern="1200">
+        <a:solidFill>
+          <a:schemeClr val="tx1"/>
+        </a:solidFill>
+        <a:latin typeface="+mn-lt"/>
+        <a:ea typeface="+mn-ea"/>
+        <a:cs typeface="+mn-cs"/>
+      </a:defRPr>
+    </a:lvl5pPr>
+    <a:lvl6pPr marL="2286000" algn="l" defTabSz="914400" rtl="0" eaLnBrk="1" latinLnBrk="0" hangingPunct="1">
+      <a:defRPr sz="1200" kern="1200">
+        <a:solidFill>
+          <a:schemeClr val="tx1"/>
+        </a:solidFill>
+        <a:latin typeface="+mn-lt"/>
+        <a:ea typeface="+mn-ea"/>
+        <a:cs typeface="+mn-cs"/>
+      </a:defRPr>
+    </a:lvl6pPr>
+    <a:lvl7pPr marL="2743200" algn="l" defTabSz="914400" rtl="0" eaLnBrk="1" latinLnBrk="0" hangingPunct="1">
+      <a:defRPr sz="1200" kern="1200">
+        <a:solidFill>
+          <a:schemeClr val="tx1"/>
+        </a:solidFill>
+        <a:latin typeface="+mn-lt"/>
+        <a:ea typeface="+mn-ea"/>
+        <a:cs typeface="+mn-cs"/>
+      </a:defRPr>
+    </a:lvl7pPr>
+    <a:lvl8pPr marL="3200400" algn="l" defTabSz="914400" rtl="0" eaLnBrk="1" latinLnBrk="0" hangingPunct="1">
+      <a:defRPr sz="1200" kern="1200">
+        <a:solidFill>
+          <a:schemeClr val="tx1"/>
+        </a:solidFill>
+        <a:latin typeface="+mn-lt"/>
+        <a:ea typeface="+mn-ea"/>
+        <a:cs typeface="+mn-cs"/>
+      </a:defRPr>
+    </a:lvl8pPr>
+    <a:lvl9pPr marL="3657600" algn="l" defTabSz="914400" rtl="0" eaLnBrk="1" latinLnBrk="0" hangingPunct="1">
+      <a:defRPr sz="1200" kern="1200">
+        <a:solidFill>
+          <a:schemeClr val="tx1"/>
+        </a:solidFill>
+        <a:latin typeface="+mn-lt"/>
+        <a:ea typeface="+mn-ea"/>
+        <a:cs typeface="+mn-cs"/>
+      </a:defRPr>
+    </a:lvl9pPr>
+  </p:notesStyle>
+</p:notesMaster>
+</file>
+
+<file path=ppt/notesSlides/notesSlide1.xml><?xml version="1.0" encoding="utf-8"?>
+<p:notes xmlns:a="http://schemas.openxmlformats.org/drawingml/2006/main" xmlns:r="http://schemas.openxmlformats.org/officeDocument/2006/relationships" xmlns:p="http://schemas.openxmlformats.org/presentationml/2006/main">
+  <p:cSld>
+    <p:spTree>
+      <p:nvGrpSpPr>
+        <p:cNvPr id="1" name=""/>
+        <p:cNvGrpSpPr/>
+        <p:nvPr/>
+      </p:nvGrpSpPr>
+      <p:grpSpPr>
+        <a:xfrm>
+          <a:off x="0" y="0"/>
+          <a:ext cx="0" cy="0"/>
+          <a:chOff x="0" y="0"/>
+          <a:chExt cx="0" cy="0"/>
+        </a:xfrm>
+      </p:grpSpPr>
+      <p:sp>
+        <p:nvSpPr>
+          <p:cNvPr id="2" name="Slide Image Placeholder 1"/>
+          <p:cNvSpPr>
+            <a:spLocks noGrp="1" noRot="1" noChangeAspect="1"/>
+          </p:cNvSpPr>
+          <p:nvPr>
+            <p:ph type="sldImg"/>
+          </p:nvPr>
+        </p:nvSpPr>
+        <p:spPr/>
+      </p:sp>
+      <p:sp>
+        <p:nvSpPr>
+          <p:cNvPr id="3" name="Notes Placeholder 2"/>
+          <p:cNvSpPr>
+            <a:spLocks noGrp="1"/>
+          </p:cNvSpPr>
+          <p:nvPr>
+            <p:ph type="body" idx="1"/>
+          </p:nvPr>
+        </p:nvSpPr>
+        <p:spPr/>
+        <p:txBody>
+          <a:bodyPr/>
+          <a:lstStyle/>
+          <a:p>
+            <a:r>
+              <a:rPr lang="en-US" dirty="0" smtClean="0"/>
+              <a:t>http://upload.wikimedia.org/wikipedia/commons/thumb/d/d0/VR_complex.svg/500px-VR_complex.svg.png</a:t>
+            </a:r>
+            <a:endParaRPr lang="en-US" dirty="0"/>
+          </a:p>
+        </p:txBody>
+      </p:sp>
+      <p:sp>
+        <p:nvSpPr>
+          <p:cNvPr id="4" name="Slide Number Placeholder 3"/>
+          <p:cNvSpPr>
+            <a:spLocks noGrp="1"/>
+          </p:cNvSpPr>
+          <p:nvPr>
+            <p:ph type="sldNum" sz="quarter" idx="10"/>
+          </p:nvPr>
+        </p:nvSpPr>
+        <p:spPr/>
+        <p:txBody>
+          <a:bodyPr/>
+          <a:lstStyle/>
+          <a:p>
+            <a:fld id="{7B7548D5-81C3-4F6E-8F88-55AD18B7E94C}" type="slidenum">
+              <a:rPr lang="en-US" smtClean="0"/>
+              <a:t>7</a:t>
+            </a:fld>
+            <a:endParaRPr lang="en-US"/>
+          </a:p>
+        </p:txBody>
+      </p:sp>
+    </p:spTree>
+    <p:extLst>
+      <p:ext uri="{BB962C8B-B14F-4D97-AF65-F5344CB8AC3E}">
+        <p14:creationId xmlns:p14="http://schemas.microsoft.com/office/powerpoint/2010/main" val="355906921"/>
+      </p:ext>
+    </p:extLst>
+  </p:cSld>
+  <p:clrMapOvr>
+    <a:masterClrMapping/>
+  </p:clrMapOvr>
+</p:notes>
+</file>
+
 <file path=ppt/slideLayouts/slideLayout1.xml><?xml version="1.0" encoding="utf-8"?>
 <p:sldLayout xmlns:a="http://schemas.openxmlformats.org/drawingml/2006/main" xmlns:r="http://schemas.openxmlformats.org/officeDocument/2006/relationships" xmlns:p="http://schemas.openxmlformats.org/presentationml/2006/main" type="title" preserve="1">
   <p:cSld name="Title Slide">
@@ -301,7 +744,7 @@
             <a:fld id="{2FE7D661-1836-44F7-8FAF-35E8F866ECD3}" type="datetime1">
               <a:rPr lang="en-US" smtClean="0"/>
               <a:pPr/>
-              <a:t>5/10/11</a:t>
+              <a:t>5/10/2011</a:t>
             </a:fld>
             <a:endParaRPr lang="en-US"/>
           </a:p>
@@ -467,7 +910,7 @@
           <a:p>
             <a:fld id="{B1FF71CE-B899-4B2B-848D-9F12F0C901B6}" type="datetimeFigureOut">
               <a:rPr lang="en-US" smtClean="0"/>
-              <a:t>5/10/11</a:t>
+              <a:t>5/10/2011</a:t>
             </a:fld>
             <a:endParaRPr lang="en-US"/>
           </a:p>
@@ -643,7 +1086,7 @@
             <a:fld id="{102CF1CA-F464-4B29-B867-EAF8A9B936E3}" type="datetime1">
               <a:rPr lang="en-US" smtClean="0"/>
               <a:pPr/>
-              <a:t>5/10/11</a:t>
+              <a:t>5/10/2011</a:t>
             </a:fld>
             <a:endParaRPr lang="en-US" dirty="0"/>
           </a:p>
@@ -810,7 +1253,7 @@
             <a:fld id="{CAE6B357-51B9-47D2-A71D-0D06CB03185D}" type="datetime1">
               <a:rPr lang="en-US" smtClean="0"/>
               <a:pPr/>
-              <a:t>5/10/11</a:t>
+              <a:t>5/10/2011</a:t>
             </a:fld>
             <a:endParaRPr lang="en-US"/>
           </a:p>
@@ -1051,7 +1494,7 @@
             <a:fld id="{058CB827-F132-4DF6-9FB9-4035A4C798EF}" type="datetime1">
               <a:rPr lang="en-US" smtClean="0"/>
               <a:pPr/>
-              <a:t>5/10/11</a:t>
+              <a:t>5/10/2011</a:t>
             </a:fld>
             <a:endParaRPr lang="en-US"/>
           </a:p>
@@ -1143,7 +1586,7 @@
             <a:fld id="{1A92A601-7D32-4ED7-AD1A-974B6DDBDCDC}" type="datetime1">
               <a:rPr lang="en-US" smtClean="0"/>
               <a:pPr/>
-              <a:t>5/10/11</a:t>
+              <a:t>5/10/2011</a:t>
             </a:fld>
             <a:endParaRPr lang="en-US"/>
           </a:p>
@@ -1519,7 +1962,7 @@
             <a:fld id="{63A17B41-4A0C-4639-A132-E5C8F99A4BE8}" type="datetime1">
               <a:rPr lang="en-US" smtClean="0"/>
               <a:pPr/>
-              <a:t>5/10/11</a:t>
+              <a:t>5/10/2011</a:t>
             </a:fld>
             <a:endParaRPr lang="en-US"/>
           </a:p>
@@ -1776,7 +2219,7 @@
             <a:fld id="{BE9967FD-6084-4075-993E-77EC8038773F}" type="datetime1">
               <a:rPr lang="en-US" smtClean="0"/>
               <a:pPr/>
-              <a:t>5/10/11</a:t>
+              <a:t>5/10/2011</a:t>
             </a:fld>
             <a:endParaRPr lang="en-US"/>
           </a:p>
@@ -1868,7 +2311,7 @@
             <a:fld id="{3B988B47-74BA-4873-ADAE-EB0120124E83}" type="datetime1">
               <a:rPr lang="en-US" smtClean="0"/>
               <a:pPr/>
-              <a:t>5/10/11</a:t>
+              <a:t>5/10/2011</a:t>
             </a:fld>
             <a:endParaRPr lang="en-US"/>
           </a:p>
@@ -2144,7 +2587,7 @@
             <a:fld id="{93CF52C1-9A39-494C-9977-BBEFAB872C1F}" type="datetime1">
               <a:rPr lang="en-US" smtClean="0"/>
               <a:pPr/>
-              <a:t>5/10/11</a:t>
+              <a:t>5/10/2011</a:t>
             </a:fld>
             <a:endParaRPr lang="en-US"/>
           </a:p>
@@ -2418,7 +2861,7 @@
             <a:fld id="{CD1EACE2-EA00-4376-9A66-47ABB8B02CF5}" type="datetime1">
               <a:rPr lang="en-US" smtClean="0"/>
               <a:pPr/>
-              <a:t>5/10/11</a:t>
+              <a:t>5/10/2011</a:t>
             </a:fld>
             <a:endParaRPr lang="en-US"/>
           </a:p>
@@ -2720,7 +3163,7 @@
             <a:fld id="{DA47DADC-55EA-4839-91C8-5BCC0EC06F5C}" type="datetime1">
               <a:rPr lang="en-US" smtClean="0"/>
               <a:pPr/>
-              <a:t>5/10/11</a:t>
+              <a:t>5/10/2011</a:t>
             </a:fld>
             <a:endParaRPr lang="en-US" dirty="0"/>
           </a:p>
@@ -3813,7 +4256,6 @@
               <a:rPr lang="en-US" dirty="0"/>
               <a:t>    #  see below</a:t>
             </a:r>
-            <a:endParaRPr lang="en-US" dirty="0"/>
           </a:p>
         </p:txBody>
       </p:sp>
@@ -3929,38 +4371,221 @@
             <p:ph type="title"/>
           </p:nvPr>
         </p:nvSpPr>
-        <p:spPr/>
-        <p:txBody>
-          <a:bodyPr/>
-          <a:lstStyle/>
-          <a:p>
-            <a:endParaRPr lang="en-US"/>
-          </a:p>
-        </p:txBody>
-      </p:sp>
-      <p:sp>
-        <p:nvSpPr>
-          <p:cNvPr id="3" name="Content Placeholder 2"/>
-          <p:cNvSpPr>
-            <a:spLocks noGrp="1"/>
-          </p:cNvSpPr>
+        <p:spPr>
+          <a:xfrm>
+            <a:off x="914400" y="258840"/>
+            <a:ext cx="7315200" cy="1154097"/>
+          </a:xfrm>
+        </p:spPr>
+        <p:txBody>
+          <a:bodyPr>
+            <a:normAutofit fontScale="90000"/>
+          </a:bodyPr>
+          <a:lstStyle/>
+          <a:p>
+            <a:r>
+              <a:rPr lang="en-US" dirty="0" smtClean="0"/>
+              <a:t>Example of multiple cliques in a  graph</a:t>
+            </a:r>
+            <a:endParaRPr lang="en-US" dirty="0"/>
+          </a:p>
+        </p:txBody>
+      </p:sp>
+      <p:pic>
+        <p:nvPicPr>
+          <p:cNvPr id="1027" name="Picture 3" descr="C:\Users\belldandy\Downloads\500px-VR_complex.svg.png"/>
+          <p:cNvPicPr>
+            <a:picLocks noGrp="1" noChangeAspect="1" noChangeArrowheads="1"/>
+          </p:cNvPicPr>
           <p:nvPr>
             <p:ph idx="1"/>
           </p:nvPr>
-        </p:nvSpPr>
-        <p:spPr/>
-        <p:txBody>
-          <a:bodyPr/>
-          <a:lstStyle/>
-          <a:p>
-            <a:endParaRPr lang="en-US"/>
-          </a:p>
-        </p:txBody>
-      </p:sp>
+        </p:nvPicPr>
+        <p:blipFill>
+          <a:blip r:embed="rId3">
+            <a:extLst>
+              <a:ext uri="{28A0092B-C50C-407E-A947-70E740481C1C}">
+                <a14:useLocalDpi xmlns:a14="http://schemas.microsoft.com/office/drawing/2010/main" val="0"/>
+              </a:ext>
+            </a:extLst>
+          </a:blip>
+          <a:srcRect/>
+          <a:stretch>
+            <a:fillRect/>
+          </a:stretch>
+        </p:blipFill>
+        <p:spPr bwMode="auto">
+          <a:xfrm>
+            <a:off x="1160265" y="1616295"/>
+            <a:ext cx="6169223" cy="4935379"/>
+          </a:xfrm>
+          <a:prstGeom prst="rect">
+            <a:avLst/>
+          </a:prstGeom>
+          <a:noFill/>
+          <a:extLst>
+            <a:ext uri="{909E8E84-426E-40DD-AFC4-6F175D3DCCD1}">
+              <a14:hiddenFill xmlns:a14="http://schemas.microsoft.com/office/drawing/2010/main">
+                <a:solidFill>
+                  <a:srgbClr val="FFFFFF"/>
+                </a:solidFill>
+              </a14:hiddenFill>
+            </a:ext>
+          </a:extLst>
+        </p:spPr>
+      </p:pic>
     </p:spTree>
     <p:extLst>
       <p:ext uri="{BB962C8B-B14F-4D97-AF65-F5344CB8AC3E}">
         <p14:creationId xmlns:p14="http://schemas.microsoft.com/office/powerpoint/2010/main" val="1906748901"/>
+      </p:ext>
+    </p:extLst>
+  </p:cSld>
+  <p:clrMapOvr>
+    <a:masterClrMapping/>
+  </p:clrMapOvr>
+</p:sld>
+</file>
+
+<file path=ppt/slides/slide8.xml><?xml version="1.0" encoding="utf-8"?>
+<p:sld xmlns:a="http://schemas.openxmlformats.org/drawingml/2006/main" xmlns:r="http://schemas.openxmlformats.org/officeDocument/2006/relationships" xmlns:p="http://schemas.openxmlformats.org/presentationml/2006/main">
+  <p:cSld>
+    <p:spTree>
+      <p:nvGrpSpPr>
+        <p:cNvPr id="1" name=""/>
+        <p:cNvGrpSpPr/>
+        <p:nvPr/>
+      </p:nvGrpSpPr>
+      <p:grpSpPr>
+        <a:xfrm>
+          <a:off x="0" y="0"/>
+          <a:ext cx="0" cy="0"/>
+          <a:chOff x="0" y="0"/>
+          <a:chExt cx="0" cy="0"/>
+        </a:xfrm>
+      </p:grpSpPr>
+      <p:sp>
+        <p:nvSpPr>
+          <p:cNvPr id="2" name="Title 1"/>
+          <p:cNvSpPr>
+            <a:spLocks noGrp="1"/>
+          </p:cNvSpPr>
+          <p:nvPr>
+            <p:ph type="title"/>
+          </p:nvPr>
+        </p:nvSpPr>
+        <p:spPr/>
+        <p:txBody>
+          <a:bodyPr>
+            <a:normAutofit fontScale="90000"/>
+          </a:bodyPr>
+          <a:lstStyle/>
+          <a:p>
+            <a:r>
+              <a:rPr lang="en-US" dirty="0" smtClean="0"/>
+              <a:t>Sup figure that explains the greedy method to finding a clique</a:t>
+            </a:r>
+            <a:endParaRPr lang="en-US" dirty="0"/>
+          </a:p>
+        </p:txBody>
+      </p:sp>
+      <p:sp>
+        <p:nvSpPr>
+          <p:cNvPr id="3" name="Content Placeholder 2"/>
+          <p:cNvSpPr>
+            <a:spLocks noGrp="1"/>
+          </p:cNvSpPr>
+          <p:nvPr>
+            <p:ph idx="1"/>
+          </p:nvPr>
+        </p:nvSpPr>
+        <p:spPr/>
+        <p:txBody>
+          <a:bodyPr/>
+          <a:lstStyle/>
+          <a:p>
+            <a:endParaRPr lang="en-US"/>
+          </a:p>
+        </p:txBody>
+      </p:sp>
+    </p:spTree>
+    <p:extLst>
+      <p:ext uri="{BB962C8B-B14F-4D97-AF65-F5344CB8AC3E}">
+        <p14:creationId xmlns:p14="http://schemas.microsoft.com/office/powerpoint/2010/main" val="1278863060"/>
+      </p:ext>
+    </p:extLst>
+  </p:cSld>
+  <p:clrMapOvr>
+    <a:masterClrMapping/>
+  </p:clrMapOvr>
+</p:sld>
+</file>
+
+<file path=ppt/slides/slide9.xml><?xml version="1.0" encoding="utf-8"?>
+<p:sld xmlns:a="http://schemas.openxmlformats.org/drawingml/2006/main" xmlns:r="http://schemas.openxmlformats.org/officeDocument/2006/relationships" xmlns:p="http://schemas.openxmlformats.org/presentationml/2006/main">
+  <p:cSld>
+    <p:spTree>
+      <p:nvGrpSpPr>
+        <p:cNvPr id="1" name=""/>
+        <p:cNvGrpSpPr/>
+        <p:nvPr/>
+      </p:nvGrpSpPr>
+      <p:grpSpPr>
+        <a:xfrm>
+          <a:off x="0" y="0"/>
+          <a:ext cx="0" cy="0"/>
+          <a:chOff x="0" y="0"/>
+          <a:chExt cx="0" cy="0"/>
+        </a:xfrm>
+      </p:grpSpPr>
+      <p:sp>
+        <p:nvSpPr>
+          <p:cNvPr id="2" name="Title 1"/>
+          <p:cNvSpPr>
+            <a:spLocks noGrp="1"/>
+          </p:cNvSpPr>
+          <p:nvPr>
+            <p:ph type="title"/>
+          </p:nvPr>
+        </p:nvSpPr>
+        <p:spPr/>
+        <p:txBody>
+          <a:bodyPr>
+            <a:normAutofit/>
+          </a:bodyPr>
+          <a:lstStyle/>
+          <a:p>
+            <a:r>
+              <a:rPr lang="en-US" smtClean="0"/>
+              <a:t>Flowchart</a:t>
+            </a:r>
+            <a:endParaRPr lang="en-US"/>
+          </a:p>
+        </p:txBody>
+      </p:sp>
+      <p:sp>
+        <p:nvSpPr>
+          <p:cNvPr id="3" name="Content Placeholder 2"/>
+          <p:cNvSpPr>
+            <a:spLocks noGrp="1"/>
+          </p:cNvSpPr>
+          <p:nvPr>
+            <p:ph idx="1"/>
+          </p:nvPr>
+        </p:nvSpPr>
+        <p:spPr/>
+        <p:txBody>
+          <a:bodyPr/>
+          <a:lstStyle/>
+          <a:p>
+            <a:endParaRPr lang="en-US"/>
+          </a:p>
+        </p:txBody>
+      </p:sp>
+    </p:spTree>
+    <p:extLst>
+      <p:ext uri="{BB962C8B-B14F-4D97-AF65-F5344CB8AC3E}">
+        <p14:creationId xmlns:p14="http://schemas.microsoft.com/office/powerpoint/2010/main" val="29402018"/>
       </p:ext>
     </p:extLst>
   </p:cSld>
@@ -4258,4 +4883,289 @@
   <a:objectDefaults/>
   <a:extraClrSchemeLst/>
 </a:theme>
+</file>
+
+<file path=ppt/theme/theme2.xml><?xml version="1.0" encoding="utf-8"?>
+<a:theme xmlns:a="http://schemas.openxmlformats.org/drawingml/2006/main" name="Office Theme">
+  <a:themeElements>
+    <a:clrScheme name="Office">
+      <a:dk1>
+        <a:sysClr val="windowText" lastClr="000000"/>
+      </a:dk1>
+      <a:lt1>
+        <a:sysClr val="window" lastClr="FFFFFF"/>
+      </a:lt1>
+      <a:dk2>
+        <a:srgbClr val="1F497D"/>
+      </a:dk2>
+      <a:lt2>
+        <a:srgbClr val="EEECE1"/>
+      </a:lt2>
+      <a:accent1>
+        <a:srgbClr val="4F81BD"/>
+      </a:accent1>
+      <a:accent2>
+        <a:srgbClr val="C0504D"/>
+      </a:accent2>
+      <a:accent3>
+        <a:srgbClr val="9BBB59"/>
+      </a:accent3>
+      <a:accent4>
+        <a:srgbClr val="8064A2"/>
+      </a:accent4>
+      <a:accent5>
+        <a:srgbClr val="4BACC6"/>
+      </a:accent5>
+      <a:accent6>
+        <a:srgbClr val="F79646"/>
+      </a:accent6>
+      <a:hlink>
+        <a:srgbClr val="0000FF"/>
+      </a:hlink>
+      <a:folHlink>
+        <a:srgbClr val="800080"/>
+      </a:folHlink>
+    </a:clrScheme>
+    <a:fontScheme name="Office">
+      <a:majorFont>
+        <a:latin typeface="Calibri"/>
+        <a:ea typeface=""/>
+        <a:cs typeface=""/>
+        <a:font script="Jpan" typeface="ＭＳ Ｐゴシック"/>
+        <a:font script="Hang" typeface="맑은 고딕"/>
+        <a:font script="Hans" typeface="宋体"/>
+        <a:font script="Hant" typeface="新細明體"/>
+        <a:font script="Arab" typeface="Times New Roman"/>
+        <a:font script="Hebr" typeface="Times New Roman"/>
+        <a:font script="Thai" typeface="Angsana New"/>
+        <a:font script="Ethi" typeface="Nyala"/>
+        <a:font script="Beng" typeface="Vrinda"/>
+        <a:font script="Gujr" typeface="Shruti"/>
+        <a:font script="Khmr" typeface="MoolBoran"/>
+        <a:font script="Knda" typeface="Tunga"/>
+        <a:font script="Guru" typeface="Raavi"/>
+        <a:font script="Cans" typeface="Euphemia"/>
+        <a:font script="Cher" typeface="Plantagenet Cherokee"/>
+        <a:font script="Yiii" typeface="Microsoft Yi Baiti"/>
+        <a:font script="Tibt" typeface="Microsoft Himalaya"/>
+        <a:font script="Thaa" typeface="MV Boli"/>
+        <a:font script="Deva" typeface="Mangal"/>
+        <a:font script="Telu" typeface="Gautami"/>
+        <a:font script="Taml" typeface="Latha"/>
+        <a:font script="Syrc" typeface="Estrangelo Edessa"/>
+        <a:font script="Orya" typeface="Kalinga"/>
+        <a:font script="Mlym" typeface="Kartika"/>
+        <a:font script="Laoo" typeface="DokChampa"/>
+        <a:font script="Sinh" typeface="Iskoola Pota"/>
+        <a:font script="Mong" typeface="Mongolian Baiti"/>
+        <a:font script="Viet" typeface="Times New Roman"/>
+        <a:font script="Uigh" typeface="Microsoft Uighur"/>
+        <a:font script="Geor" typeface="Sylfaen"/>
+      </a:majorFont>
+      <a:minorFont>
+        <a:latin typeface="Calibri"/>
+        <a:ea typeface=""/>
+        <a:cs typeface=""/>
+        <a:font script="Jpan" typeface="ＭＳ Ｐゴシック"/>
+        <a:font script="Hang" typeface="맑은 고딕"/>
+        <a:font script="Hans" typeface="宋体"/>
+        <a:font script="Hant" typeface="新細明體"/>
+        <a:font script="Arab" typeface="Arial"/>
+        <a:font script="Hebr" typeface="Arial"/>
+        <a:font script="Thai" typeface="Cordia New"/>
+        <a:font script="Ethi" typeface="Nyala"/>
+        <a:font script="Beng" typeface="Vrinda"/>
+        <a:font script="Gujr" typeface="Shruti"/>
+        <a:font script="Khmr" typeface="DaunPenh"/>
+        <a:font script="Knda" typeface="Tunga"/>
+        <a:font script="Guru" typeface="Raavi"/>
+        <a:font script="Cans" typeface="Euphemia"/>
+        <a:font script="Cher" typeface="Plantagenet Cherokee"/>
+        <a:font script="Yiii" typeface="Microsoft Yi Baiti"/>
+        <a:font script="Tibt" typeface="Microsoft Himalaya"/>
+        <a:font script="Thaa" typeface="MV Boli"/>
+        <a:font script="Deva" typeface="Mangal"/>
+        <a:font script="Telu" typeface="Gautami"/>
+        <a:font script="Taml" typeface="Latha"/>
+        <a:font script="Syrc" typeface="Estrangelo Edessa"/>
+        <a:font script="Orya" typeface="Kalinga"/>
+        <a:font script="Mlym" typeface="Kartika"/>
+        <a:font script="Laoo" typeface="DokChampa"/>
+        <a:font script="Sinh" typeface="Iskoola Pota"/>
+        <a:font script="Mong" typeface="Mongolian Baiti"/>
+        <a:font script="Viet" typeface="Arial"/>
+        <a:font script="Uigh" typeface="Microsoft Uighur"/>
+        <a:font script="Geor" typeface="Sylfaen"/>
+      </a:minorFont>
+    </a:fontScheme>
+    <a:fmtScheme name="Office">
+      <a:fillStyleLst>
+        <a:solidFill>
+          <a:schemeClr val="phClr"/>
+        </a:solidFill>
+        <a:gradFill rotWithShape="1">
+          <a:gsLst>
+            <a:gs pos="0">
+              <a:schemeClr val="phClr">
+                <a:tint val="50000"/>
+                <a:satMod val="300000"/>
+              </a:schemeClr>
+            </a:gs>
+            <a:gs pos="35000">
+              <a:schemeClr val="phClr">
+                <a:tint val="37000"/>
+                <a:satMod val="300000"/>
+              </a:schemeClr>
+            </a:gs>
+            <a:gs pos="100000">
+              <a:schemeClr val="phClr">
+                <a:tint val="15000"/>
+                <a:satMod val="350000"/>
+              </a:schemeClr>
+            </a:gs>
+          </a:gsLst>
+          <a:lin ang="16200000" scaled="1"/>
+        </a:gradFill>
+        <a:gradFill rotWithShape="1">
+          <a:gsLst>
+            <a:gs pos="0">
+              <a:schemeClr val="phClr">
+                <a:shade val="51000"/>
+                <a:satMod val="130000"/>
+              </a:schemeClr>
+            </a:gs>
+            <a:gs pos="80000">
+              <a:schemeClr val="phClr">
+                <a:shade val="93000"/>
+                <a:satMod val="130000"/>
+              </a:schemeClr>
+            </a:gs>
+            <a:gs pos="100000">
+              <a:schemeClr val="phClr">
+                <a:shade val="94000"/>
+                <a:satMod val="135000"/>
+              </a:schemeClr>
+            </a:gs>
+          </a:gsLst>
+          <a:lin ang="16200000" scaled="0"/>
+        </a:gradFill>
+      </a:fillStyleLst>
+      <a:lnStyleLst>
+        <a:ln w="9525" cap="flat" cmpd="sng" algn="ctr">
+          <a:solidFill>
+            <a:schemeClr val="phClr">
+              <a:shade val="95000"/>
+              <a:satMod val="105000"/>
+            </a:schemeClr>
+          </a:solidFill>
+          <a:prstDash val="solid"/>
+        </a:ln>
+        <a:ln w="25400" cap="flat" cmpd="sng" algn="ctr">
+          <a:solidFill>
+            <a:schemeClr val="phClr"/>
+          </a:solidFill>
+          <a:prstDash val="solid"/>
+        </a:ln>
+        <a:ln w="38100" cap="flat" cmpd="sng" algn="ctr">
+          <a:solidFill>
+            <a:schemeClr val="phClr"/>
+          </a:solidFill>
+          <a:prstDash val="solid"/>
+        </a:ln>
+      </a:lnStyleLst>
+      <a:effectStyleLst>
+        <a:effectStyle>
+          <a:effectLst>
+            <a:outerShdw blurRad="40000" dist="20000" dir="5400000" rotWithShape="0">
+              <a:srgbClr val="000000">
+                <a:alpha val="38000"/>
+              </a:srgbClr>
+            </a:outerShdw>
+          </a:effectLst>
+        </a:effectStyle>
+        <a:effectStyle>
+          <a:effectLst>
+            <a:outerShdw blurRad="40000" dist="23000" dir="5400000" rotWithShape="0">
+              <a:srgbClr val="000000">
+                <a:alpha val="35000"/>
+              </a:srgbClr>
+            </a:outerShdw>
+          </a:effectLst>
+        </a:effectStyle>
+        <a:effectStyle>
+          <a:effectLst>
+            <a:outerShdw blurRad="40000" dist="23000" dir="5400000" rotWithShape="0">
+              <a:srgbClr val="000000">
+                <a:alpha val="35000"/>
+              </a:srgbClr>
+            </a:outerShdw>
+          </a:effectLst>
+          <a:scene3d>
+            <a:camera prst="orthographicFront">
+              <a:rot lat="0" lon="0" rev="0"/>
+            </a:camera>
+            <a:lightRig rig="threePt" dir="t">
+              <a:rot lat="0" lon="0" rev="1200000"/>
+            </a:lightRig>
+          </a:scene3d>
+          <a:sp3d>
+            <a:bevelT w="63500" h="25400"/>
+          </a:sp3d>
+        </a:effectStyle>
+      </a:effectStyleLst>
+      <a:bgFillStyleLst>
+        <a:solidFill>
+          <a:schemeClr val="phClr"/>
+        </a:solidFill>
+        <a:gradFill rotWithShape="1">
+          <a:gsLst>
+            <a:gs pos="0">
+              <a:schemeClr val="phClr">
+                <a:tint val="40000"/>
+                <a:satMod val="350000"/>
+              </a:schemeClr>
+            </a:gs>
+            <a:gs pos="40000">
+              <a:schemeClr val="phClr">
+                <a:tint val="45000"/>
+                <a:shade val="99000"/>
+                <a:satMod val="350000"/>
+              </a:schemeClr>
+            </a:gs>
+            <a:gs pos="100000">
+              <a:schemeClr val="phClr">
+                <a:shade val="20000"/>
+                <a:satMod val="255000"/>
+              </a:schemeClr>
+            </a:gs>
+          </a:gsLst>
+          <a:path path="circle">
+            <a:fillToRect l="50000" t="-80000" r="50000" b="180000"/>
+          </a:path>
+        </a:gradFill>
+        <a:gradFill rotWithShape="1">
+          <a:gsLst>
+            <a:gs pos="0">
+              <a:schemeClr val="phClr">
+                <a:tint val="80000"/>
+                <a:satMod val="300000"/>
+              </a:schemeClr>
+            </a:gs>
+            <a:gs pos="100000">
+              <a:schemeClr val="phClr">
+                <a:shade val="30000"/>
+                <a:satMod val="200000"/>
+              </a:schemeClr>
+            </a:gs>
+          </a:gsLst>
+          <a:path path="circle">
+            <a:fillToRect l="50000" t="50000" r="50000" b="50000"/>
+          </a:path>
+        </a:gradFill>
+      </a:bgFillStyleLst>
+    </a:fmtScheme>
+  </a:themeElements>
+  <a:objectDefaults/>
+  <a:extraClrSchemeLst/>
+</a:theme>
 </file>
</xml_diff>

<commit_message>
almost done with ppt
</commit_message>
<xml_diff>
--- a/bioinformatics presentation.pptx
+++ b/bioinformatics presentation.pptx
@@ -5,18 +5,28 @@
     <p:sldMasterId id="2147483660" r:id="rId1"/>
   </p:sldMasterIdLst>
   <p:notesMasterIdLst>
-    <p:notesMasterId r:id="rId11"/>
+    <p:notesMasterId r:id="rId21"/>
   </p:notesMasterIdLst>
   <p:sldIdLst>
     <p:sldId id="256" r:id="rId2"/>
     <p:sldId id="257" r:id="rId3"/>
-    <p:sldId id="258" r:id="rId4"/>
-    <p:sldId id="259" r:id="rId5"/>
-    <p:sldId id="262" r:id="rId6"/>
-    <p:sldId id="260" r:id="rId7"/>
-    <p:sldId id="261" r:id="rId8"/>
-    <p:sldId id="263" r:id="rId9"/>
-    <p:sldId id="264" r:id="rId10"/>
+    <p:sldId id="264" r:id="rId4"/>
+    <p:sldId id="258" r:id="rId5"/>
+    <p:sldId id="275" r:id="rId6"/>
+    <p:sldId id="265" r:id="rId7"/>
+    <p:sldId id="269" r:id="rId8"/>
+    <p:sldId id="266" r:id="rId9"/>
+    <p:sldId id="267" r:id="rId10"/>
+    <p:sldId id="270" r:id="rId11"/>
+    <p:sldId id="271" r:id="rId12"/>
+    <p:sldId id="259" r:id="rId13"/>
+    <p:sldId id="262" r:id="rId14"/>
+    <p:sldId id="272" r:id="rId15"/>
+    <p:sldId id="273" r:id="rId16"/>
+    <p:sldId id="260" r:id="rId17"/>
+    <p:sldId id="263" r:id="rId18"/>
+    <p:sldId id="268" r:id="rId19"/>
+    <p:sldId id="274" r:id="rId20"/>
   </p:sldIdLst>
   <p:sldSz cx="9144000" cy="6858000" type="screen4x3"/>
   <p:notesSz cx="6858000" cy="9144000"/>
@@ -200,7 +210,7 @@
           <a:p>
             <a:fld id="{79D92611-7840-41C4-A505-64402AD7E116}" type="datetimeFigureOut">
               <a:rPr lang="en-US" smtClean="0"/>
-              <a:t>5/10/2011</a:t>
+              <a:t>5/11/11</a:t>
             </a:fld>
             <a:endParaRPr lang="en-US"/>
           </a:p>
@@ -468,94 +478,6 @@
 </p:notesMaster>
 </file>
 
-<file path=ppt/notesSlides/notesSlide1.xml><?xml version="1.0" encoding="utf-8"?>
-<p:notes xmlns:a="http://schemas.openxmlformats.org/drawingml/2006/main" xmlns:r="http://schemas.openxmlformats.org/officeDocument/2006/relationships" xmlns:p="http://schemas.openxmlformats.org/presentationml/2006/main">
-  <p:cSld>
-    <p:spTree>
-      <p:nvGrpSpPr>
-        <p:cNvPr id="1" name=""/>
-        <p:cNvGrpSpPr/>
-        <p:nvPr/>
-      </p:nvGrpSpPr>
-      <p:grpSpPr>
-        <a:xfrm>
-          <a:off x="0" y="0"/>
-          <a:ext cx="0" cy="0"/>
-          <a:chOff x="0" y="0"/>
-          <a:chExt cx="0" cy="0"/>
-        </a:xfrm>
-      </p:grpSpPr>
-      <p:sp>
-        <p:nvSpPr>
-          <p:cNvPr id="2" name="Slide Image Placeholder 1"/>
-          <p:cNvSpPr>
-            <a:spLocks noGrp="1" noRot="1" noChangeAspect="1"/>
-          </p:cNvSpPr>
-          <p:nvPr>
-            <p:ph type="sldImg"/>
-          </p:nvPr>
-        </p:nvSpPr>
-        <p:spPr/>
-      </p:sp>
-      <p:sp>
-        <p:nvSpPr>
-          <p:cNvPr id="3" name="Notes Placeholder 2"/>
-          <p:cNvSpPr>
-            <a:spLocks noGrp="1"/>
-          </p:cNvSpPr>
-          <p:nvPr>
-            <p:ph type="body" idx="1"/>
-          </p:nvPr>
-        </p:nvSpPr>
-        <p:spPr/>
-        <p:txBody>
-          <a:bodyPr/>
-          <a:lstStyle/>
-          <a:p>
-            <a:r>
-              <a:rPr lang="en-US" dirty="0" smtClean="0"/>
-              <a:t>http://upload.wikimedia.org/wikipedia/commons/thumb/d/d0/VR_complex.svg/500px-VR_complex.svg.png</a:t>
-            </a:r>
-            <a:endParaRPr lang="en-US" dirty="0"/>
-          </a:p>
-        </p:txBody>
-      </p:sp>
-      <p:sp>
-        <p:nvSpPr>
-          <p:cNvPr id="4" name="Slide Number Placeholder 3"/>
-          <p:cNvSpPr>
-            <a:spLocks noGrp="1"/>
-          </p:cNvSpPr>
-          <p:nvPr>
-            <p:ph type="sldNum" sz="quarter" idx="10"/>
-          </p:nvPr>
-        </p:nvSpPr>
-        <p:spPr/>
-        <p:txBody>
-          <a:bodyPr/>
-          <a:lstStyle/>
-          <a:p>
-            <a:fld id="{7B7548D5-81C3-4F6E-8F88-55AD18B7E94C}" type="slidenum">
-              <a:rPr lang="en-US" smtClean="0"/>
-              <a:t>7</a:t>
-            </a:fld>
-            <a:endParaRPr lang="en-US"/>
-          </a:p>
-        </p:txBody>
-      </p:sp>
-    </p:spTree>
-    <p:extLst>
-      <p:ext uri="{BB962C8B-B14F-4D97-AF65-F5344CB8AC3E}">
-        <p14:creationId xmlns:p14="http://schemas.microsoft.com/office/powerpoint/2010/main" val="355906921"/>
-      </p:ext>
-    </p:extLst>
-  </p:cSld>
-  <p:clrMapOvr>
-    <a:masterClrMapping/>
-  </p:clrMapOvr>
-</p:notes>
-</file>
-
 <file path=ppt/slideLayouts/slideLayout1.xml><?xml version="1.0" encoding="utf-8"?>
 <p:sldLayout xmlns:a="http://schemas.openxmlformats.org/drawingml/2006/main" xmlns:r="http://schemas.openxmlformats.org/officeDocument/2006/relationships" xmlns:p="http://schemas.openxmlformats.org/presentationml/2006/main" type="title" preserve="1">
   <p:cSld name="Title Slide">
@@ -744,7 +666,7 @@
             <a:fld id="{2FE7D661-1836-44F7-8FAF-35E8F866ECD3}" type="datetime1">
               <a:rPr lang="en-US" smtClean="0"/>
               <a:pPr/>
-              <a:t>5/10/2011</a:t>
+              <a:t>5/11/11</a:t>
             </a:fld>
             <a:endParaRPr lang="en-US"/>
           </a:p>
@@ -910,7 +832,7 @@
           <a:p>
             <a:fld id="{B1FF71CE-B899-4B2B-848D-9F12F0C901B6}" type="datetimeFigureOut">
               <a:rPr lang="en-US" smtClean="0"/>
-              <a:t>5/10/2011</a:t>
+              <a:t>5/11/11</a:t>
             </a:fld>
             <a:endParaRPr lang="en-US"/>
           </a:p>
@@ -1086,7 +1008,7 @@
             <a:fld id="{102CF1CA-F464-4B29-B867-EAF8A9B936E3}" type="datetime1">
               <a:rPr lang="en-US" smtClean="0"/>
               <a:pPr/>
-              <a:t>5/10/2011</a:t>
+              <a:t>5/11/11</a:t>
             </a:fld>
             <a:endParaRPr lang="en-US" dirty="0"/>
           </a:p>
@@ -1253,7 +1175,7 @@
             <a:fld id="{CAE6B357-51B9-47D2-A71D-0D06CB03185D}" type="datetime1">
               <a:rPr lang="en-US" smtClean="0"/>
               <a:pPr/>
-              <a:t>5/10/2011</a:t>
+              <a:t>5/11/11</a:t>
             </a:fld>
             <a:endParaRPr lang="en-US"/>
           </a:p>
@@ -1494,7 +1416,7 @@
             <a:fld id="{058CB827-F132-4DF6-9FB9-4035A4C798EF}" type="datetime1">
               <a:rPr lang="en-US" smtClean="0"/>
               <a:pPr/>
-              <a:t>5/10/2011</a:t>
+              <a:t>5/11/11</a:t>
             </a:fld>
             <a:endParaRPr lang="en-US"/>
           </a:p>
@@ -1586,7 +1508,7 @@
             <a:fld id="{1A92A601-7D32-4ED7-AD1A-974B6DDBDCDC}" type="datetime1">
               <a:rPr lang="en-US" smtClean="0"/>
               <a:pPr/>
-              <a:t>5/10/2011</a:t>
+              <a:t>5/11/11</a:t>
             </a:fld>
             <a:endParaRPr lang="en-US"/>
           </a:p>
@@ -1962,7 +1884,7 @@
             <a:fld id="{63A17B41-4A0C-4639-A132-E5C8F99A4BE8}" type="datetime1">
               <a:rPr lang="en-US" smtClean="0"/>
               <a:pPr/>
-              <a:t>5/10/2011</a:t>
+              <a:t>5/11/11</a:t>
             </a:fld>
             <a:endParaRPr lang="en-US"/>
           </a:p>
@@ -2219,7 +2141,7 @@
             <a:fld id="{BE9967FD-6084-4075-993E-77EC8038773F}" type="datetime1">
               <a:rPr lang="en-US" smtClean="0"/>
               <a:pPr/>
-              <a:t>5/10/2011</a:t>
+              <a:t>5/11/11</a:t>
             </a:fld>
             <a:endParaRPr lang="en-US"/>
           </a:p>
@@ -2311,7 +2233,7 @@
             <a:fld id="{3B988B47-74BA-4873-ADAE-EB0120124E83}" type="datetime1">
               <a:rPr lang="en-US" smtClean="0"/>
               <a:pPr/>
-              <a:t>5/10/2011</a:t>
+              <a:t>5/11/11</a:t>
             </a:fld>
             <a:endParaRPr lang="en-US"/>
           </a:p>
@@ -2587,7 +2509,7 @@
             <a:fld id="{93CF52C1-9A39-494C-9977-BBEFAB872C1F}" type="datetime1">
               <a:rPr lang="en-US" smtClean="0"/>
               <a:pPr/>
-              <a:t>5/10/2011</a:t>
+              <a:t>5/11/11</a:t>
             </a:fld>
             <a:endParaRPr lang="en-US"/>
           </a:p>
@@ -2861,7 +2783,7 @@
             <a:fld id="{CD1EACE2-EA00-4376-9A66-47ABB8B02CF5}" type="datetime1">
               <a:rPr lang="en-US" smtClean="0"/>
               <a:pPr/>
-              <a:t>5/10/2011</a:t>
+              <a:t>5/11/11</a:t>
             </a:fld>
             <a:endParaRPr lang="en-US"/>
           </a:p>
@@ -3163,7 +3085,7 @@
             <a:fld id="{DA47DADC-55EA-4839-91C8-5BCC0EC06F5C}" type="datetime1">
               <a:rPr lang="en-US" smtClean="0"/>
               <a:pPr/>
-              <a:t>5/10/2011</a:t>
+              <a:t>5/11/11</a:t>
             </a:fld>
             <a:endParaRPr lang="en-US" dirty="0"/>
           </a:p>
@@ -3687,6 +3609,1275 @@
 </p:sld>
 </file>
 
+<file path=ppt/slides/slide10.xml><?xml version="1.0" encoding="utf-8"?>
+<p:sld xmlns:a="http://schemas.openxmlformats.org/drawingml/2006/main" xmlns:r="http://schemas.openxmlformats.org/officeDocument/2006/relationships" xmlns:p="http://schemas.openxmlformats.org/presentationml/2006/main">
+  <p:cSld>
+    <p:spTree>
+      <p:nvGrpSpPr>
+        <p:cNvPr id="1" name=""/>
+        <p:cNvGrpSpPr/>
+        <p:nvPr/>
+      </p:nvGrpSpPr>
+      <p:grpSpPr>
+        <a:xfrm>
+          <a:off x="0" y="0"/>
+          <a:ext cx="0" cy="0"/>
+          <a:chOff x="0" y="0"/>
+          <a:chExt cx="0" cy="0"/>
+        </a:xfrm>
+      </p:grpSpPr>
+      <p:sp>
+        <p:nvSpPr>
+          <p:cNvPr id="2" name="Title 1"/>
+          <p:cNvSpPr>
+            <a:spLocks noGrp="1"/>
+          </p:cNvSpPr>
+          <p:nvPr>
+            <p:ph type="title"/>
+          </p:nvPr>
+        </p:nvSpPr>
+        <p:spPr/>
+        <p:txBody>
+          <a:bodyPr>
+            <a:normAutofit fontScale="90000"/>
+          </a:bodyPr>
+          <a:lstStyle/>
+          <a:p>
+            <a:r>
+              <a:rPr lang="en-US" dirty="0" smtClean="0"/>
+              <a:t>Sliding matrix to find optimal alignment</a:t>
+            </a:r>
+            <a:endParaRPr lang="en-US" dirty="0"/>
+          </a:p>
+        </p:txBody>
+      </p:sp>
+      <p:pic>
+        <p:nvPicPr>
+          <p:cNvPr id="4" name="Content Placeholder 3"/>
+          <p:cNvPicPr>
+            <a:picLocks noGrp="1" noChangeAspect="1"/>
+          </p:cNvPicPr>
+          <p:nvPr>
+            <p:ph idx="1"/>
+          </p:nvPr>
+        </p:nvPicPr>
+        <p:blipFill>
+          <a:blip r:embed="rId2" cstate="print">
+            <a:extLst>
+              <a:ext uri="{28A0092B-C50C-407E-A947-70E740481C1C}">
+                <a14:useLocalDpi xmlns:a14="http://schemas.microsoft.com/office/drawing/2010/main"/>
+              </a:ext>
+            </a:extLst>
+          </a:blip>
+          <a:srcRect l="-14479" r="-14479"/>
+          <a:stretch>
+            <a:fillRect/>
+          </a:stretch>
+        </p:blipFill>
+        <p:spPr/>
+      </p:pic>
+    </p:spTree>
+    <p:extLst>
+      <p:ext uri="{BB962C8B-B14F-4D97-AF65-F5344CB8AC3E}">
+        <p14:creationId xmlns:p14="http://schemas.microsoft.com/office/powerpoint/2010/main" val="2356993806"/>
+      </p:ext>
+    </p:extLst>
+  </p:cSld>
+  <p:clrMapOvr>
+    <a:masterClrMapping/>
+  </p:clrMapOvr>
+</p:sld>
+</file>
+
+<file path=ppt/slides/slide11.xml><?xml version="1.0" encoding="utf-8"?>
+<p:sld xmlns:a="http://schemas.openxmlformats.org/drawingml/2006/main" xmlns:r="http://schemas.openxmlformats.org/officeDocument/2006/relationships" xmlns:p="http://schemas.openxmlformats.org/presentationml/2006/main">
+  <p:cSld>
+    <p:spTree>
+      <p:nvGrpSpPr>
+        <p:cNvPr id="1" name=""/>
+        <p:cNvGrpSpPr/>
+        <p:nvPr/>
+      </p:nvGrpSpPr>
+      <p:grpSpPr>
+        <a:xfrm>
+          <a:off x="0" y="0"/>
+          <a:ext cx="0" cy="0"/>
+          <a:chOff x="0" y="0"/>
+          <a:chExt cx="0" cy="0"/>
+        </a:xfrm>
+      </p:grpSpPr>
+      <p:sp>
+        <p:nvSpPr>
+          <p:cNvPr id="2" name="Title 1"/>
+          <p:cNvSpPr>
+            <a:spLocks noGrp="1"/>
+          </p:cNvSpPr>
+          <p:nvPr>
+            <p:ph type="title"/>
+          </p:nvPr>
+        </p:nvSpPr>
+        <p:spPr>
+          <a:xfrm>
+            <a:off x="914400" y="757495"/>
+            <a:ext cx="7315200" cy="1154097"/>
+          </a:xfrm>
+        </p:spPr>
+        <p:txBody>
+          <a:bodyPr/>
+          <a:lstStyle/>
+          <a:p>
+            <a:r>
+              <a:rPr lang="en-US" dirty="0" smtClean="0"/>
+              <a:t>Graph G </a:t>
+            </a:r>
+            <a:endParaRPr lang="en-US" dirty="0"/>
+          </a:p>
+        </p:txBody>
+      </p:sp>
+      <p:pic>
+        <p:nvPicPr>
+          <p:cNvPr id="8" name="Content Placeholder 7"/>
+          <p:cNvPicPr>
+            <a:picLocks noGrp="1" noChangeAspect="1"/>
+          </p:cNvPicPr>
+          <p:nvPr>
+            <p:ph idx="1"/>
+          </p:nvPr>
+        </p:nvPicPr>
+        <p:blipFill>
+          <a:blip r:embed="rId2"/>
+          <a:srcRect l="-9691" r="-9691"/>
+          <a:stretch>
+            <a:fillRect/>
+          </a:stretch>
+        </p:blipFill>
+        <p:spPr>
+          <a:xfrm>
+            <a:off x="914400" y="2045591"/>
+            <a:ext cx="7315200" cy="3539527"/>
+          </a:xfrm>
+        </p:spPr>
+      </p:pic>
+      <p:sp>
+        <p:nvSpPr>
+          <p:cNvPr id="9" name="TextBox 8"/>
+          <p:cNvSpPr txBox="1"/>
+          <p:nvPr/>
+        </p:nvSpPr>
+        <p:spPr>
+          <a:xfrm>
+            <a:off x="1679242" y="5668167"/>
+            <a:ext cx="7052819" cy="1200329"/>
+          </a:xfrm>
+          <a:prstGeom prst="rect">
+            <a:avLst/>
+          </a:prstGeom>
+          <a:noFill/>
+        </p:spPr>
+        <p:txBody>
+          <a:bodyPr wrap="square" rtlCol="0">
+            <a:spAutoFit/>
+          </a:bodyPr>
+          <a:lstStyle/>
+          <a:p>
+            <a:pPr marL="285750" indent="-285750">
+              <a:buFont typeface="Arial"/>
+              <a:buChar char="•"/>
+            </a:pPr>
+            <a:r>
+              <a:rPr lang="en-US" dirty="0" smtClean="0"/>
+              <a:t>I</a:t>
+            </a:r>
+            <a:r>
+              <a:rPr lang="en-US" baseline="-25000" dirty="0" smtClean="0"/>
+              <a:t>o</a:t>
+            </a:r>
+            <a:r>
+              <a:rPr lang="en-US" dirty="0" smtClean="0"/>
+              <a:t> is set of motifs found given the same starting sequence</a:t>
+            </a:r>
+          </a:p>
+          <a:p>
+            <a:pPr marL="285750" indent="-285750">
+              <a:buFont typeface="Arial"/>
+              <a:buChar char="•"/>
+            </a:pPr>
+            <a:r>
+              <a:rPr lang="en-US" dirty="0" smtClean="0"/>
+              <a:t>Each node is a motif</a:t>
+            </a:r>
+          </a:p>
+          <a:p>
+            <a:pPr marL="285750" indent="-285750">
+              <a:buFont typeface="Arial"/>
+              <a:buChar char="•"/>
+            </a:pPr>
+            <a:r>
+              <a:rPr lang="en-US" dirty="0" smtClean="0"/>
+              <a:t>Each edge connects similar nodes</a:t>
+            </a:r>
+          </a:p>
+          <a:p>
+            <a:pPr marL="285750" indent="-285750">
+              <a:buFont typeface="Arial"/>
+              <a:buChar char="•"/>
+            </a:pPr>
+            <a:r>
+              <a:rPr lang="en-US" dirty="0" smtClean="0"/>
+              <a:t>Edge Weight is motif similarity</a:t>
+            </a:r>
+            <a:endParaRPr lang="en-US" dirty="0"/>
+          </a:p>
+        </p:txBody>
+      </p:sp>
+    </p:spTree>
+    <p:extLst>
+      <p:ext uri="{BB962C8B-B14F-4D97-AF65-F5344CB8AC3E}">
+        <p14:creationId xmlns:p14="http://schemas.microsoft.com/office/powerpoint/2010/main" val="2768926328"/>
+      </p:ext>
+    </p:extLst>
+  </p:cSld>
+  <p:clrMapOvr>
+    <a:masterClrMapping/>
+  </p:clrMapOvr>
+</p:sld>
+</file>
+
+<file path=ppt/slides/slide12.xml><?xml version="1.0" encoding="utf-8"?>
+<p:sld xmlns:a="http://schemas.openxmlformats.org/drawingml/2006/main" xmlns:r="http://schemas.openxmlformats.org/officeDocument/2006/relationships" xmlns:p="http://schemas.openxmlformats.org/presentationml/2006/main">
+  <p:cSld>
+    <p:spTree>
+      <p:nvGrpSpPr>
+        <p:cNvPr id="1" name=""/>
+        <p:cNvGrpSpPr/>
+        <p:nvPr/>
+      </p:nvGrpSpPr>
+      <p:grpSpPr>
+        <a:xfrm>
+          <a:off x="0" y="0"/>
+          <a:ext cx="0" cy="0"/>
+          <a:chOff x="0" y="0"/>
+          <a:chExt cx="0" cy="0"/>
+        </a:xfrm>
+      </p:grpSpPr>
+      <p:sp>
+        <p:nvSpPr>
+          <p:cNvPr id="2" name="Title 1"/>
+          <p:cNvSpPr>
+            <a:spLocks noGrp="1"/>
+          </p:cNvSpPr>
+          <p:nvPr>
+            <p:ph type="title"/>
+          </p:nvPr>
+        </p:nvSpPr>
+        <p:spPr/>
+        <p:txBody>
+          <a:bodyPr/>
+          <a:lstStyle/>
+          <a:p>
+            <a:r>
+              <a:rPr lang="en-US" dirty="0" smtClean="0"/>
+              <a:t>Markov clustering algorithm</a:t>
+            </a:r>
+            <a:endParaRPr lang="en-US" dirty="0"/>
+          </a:p>
+        </p:txBody>
+      </p:sp>
+      <p:sp>
+        <p:nvSpPr>
+          <p:cNvPr id="3" name="Content Placeholder 2"/>
+          <p:cNvSpPr>
+            <a:spLocks noGrp="1"/>
+          </p:cNvSpPr>
+          <p:nvPr>
+            <p:ph idx="1"/>
+          </p:nvPr>
+        </p:nvSpPr>
+        <p:spPr>
+          <a:xfrm>
+            <a:off x="914400" y="2874795"/>
+            <a:ext cx="7315200" cy="3539527"/>
+          </a:xfrm>
+        </p:spPr>
+        <p:txBody>
+          <a:bodyPr/>
+          <a:lstStyle/>
+          <a:p>
+            <a:r>
+              <a:rPr lang="en-US" dirty="0"/>
+              <a:t>Van </a:t>
+            </a:r>
+            <a:r>
+              <a:rPr lang="en-US" dirty="0" err="1"/>
+              <a:t>Dongen</a:t>
+            </a:r>
+            <a:r>
+              <a:rPr lang="en-US" dirty="0"/>
+              <a:t>, S. (2000) Graph Clustering by </a:t>
+            </a:r>
+            <a:r>
+              <a:rPr lang="en-US" dirty="0" smtClean="0"/>
+              <a:t>Flow Simulation PhD </a:t>
+            </a:r>
+            <a:r>
+              <a:rPr lang="en-US" dirty="0"/>
+              <a:t>Thesis, University of Utrecht, The </a:t>
+            </a:r>
+            <a:r>
+              <a:rPr lang="en-US" dirty="0" smtClean="0"/>
+              <a:t>Netherlands.</a:t>
+            </a:r>
+          </a:p>
+          <a:p>
+            <a:r>
+              <a:rPr lang="en-US" dirty="0" smtClean="0"/>
+              <a:t>Works by using expansion and inflation</a:t>
+            </a:r>
+          </a:p>
+          <a:p>
+            <a:pPr lvl="1"/>
+            <a:r>
+              <a:rPr lang="en-US" dirty="0" smtClean="0"/>
+              <a:t>Expansion – flow between clusters</a:t>
+            </a:r>
+          </a:p>
+          <a:p>
+            <a:pPr lvl="1"/>
+            <a:r>
+              <a:rPr lang="en-US" dirty="0" smtClean="0"/>
+              <a:t>Inflation – Strengthens or weakens current cluster</a:t>
+            </a:r>
+          </a:p>
+          <a:p>
+            <a:r>
+              <a:rPr lang="en-US" dirty="0" smtClean="0"/>
+              <a:t>Usually reaches and idempotent matrix</a:t>
+            </a:r>
+          </a:p>
+          <a:p>
+            <a:r>
+              <a:rPr lang="en-US" dirty="0" smtClean="0"/>
+              <a:t>Runs in O(n</a:t>
+            </a:r>
+            <a:r>
+              <a:rPr lang="en-US" baseline="30000" dirty="0" smtClean="0"/>
+              <a:t>3</a:t>
+            </a:r>
+            <a:r>
+              <a:rPr lang="en-US" dirty="0" smtClean="0"/>
+              <a:t>) time</a:t>
+            </a:r>
+          </a:p>
+          <a:p>
+            <a:endParaRPr lang="en-US" dirty="0" smtClean="0"/>
+          </a:p>
+        </p:txBody>
+      </p:sp>
+    </p:spTree>
+    <p:extLst>
+      <p:ext uri="{BB962C8B-B14F-4D97-AF65-F5344CB8AC3E}">
+        <p14:creationId xmlns:p14="http://schemas.microsoft.com/office/powerpoint/2010/main" val="1809247320"/>
+      </p:ext>
+    </p:extLst>
+  </p:cSld>
+  <p:clrMapOvr>
+    <a:masterClrMapping/>
+  </p:clrMapOvr>
+</p:sld>
+</file>
+
+<file path=ppt/slides/slide13.xml><?xml version="1.0" encoding="utf-8"?>
+<p:sld xmlns:a="http://schemas.openxmlformats.org/drawingml/2006/main" xmlns:r="http://schemas.openxmlformats.org/officeDocument/2006/relationships" xmlns:p="http://schemas.openxmlformats.org/presentationml/2006/main">
+  <p:cSld>
+    <p:spTree>
+      <p:nvGrpSpPr>
+        <p:cNvPr id="1" name=""/>
+        <p:cNvGrpSpPr/>
+        <p:nvPr/>
+      </p:nvGrpSpPr>
+      <p:grpSpPr>
+        <a:xfrm>
+          <a:off x="0" y="0"/>
+          <a:ext cx="0" cy="0"/>
+          <a:chOff x="0" y="0"/>
+          <a:chExt cx="0" cy="0"/>
+        </a:xfrm>
+      </p:grpSpPr>
+      <p:sp>
+        <p:nvSpPr>
+          <p:cNvPr id="2" name="Title 1"/>
+          <p:cNvSpPr>
+            <a:spLocks noGrp="1"/>
+          </p:cNvSpPr>
+          <p:nvPr>
+            <p:ph type="title"/>
+          </p:nvPr>
+        </p:nvSpPr>
+        <p:spPr/>
+        <p:txBody>
+          <a:bodyPr/>
+          <a:lstStyle/>
+          <a:p>
+            <a:r>
+              <a:rPr lang="en-US" dirty="0" smtClean="0"/>
+              <a:t>MCL </a:t>
+            </a:r>
+            <a:r>
+              <a:rPr lang="en-US" dirty="0" err="1" smtClean="0"/>
+              <a:t>pseudocode</a:t>
+            </a:r>
+            <a:endParaRPr lang="en-US" dirty="0"/>
+          </a:p>
+        </p:txBody>
+      </p:sp>
+      <p:sp>
+        <p:nvSpPr>
+          <p:cNvPr id="3" name="Content Placeholder 2"/>
+          <p:cNvSpPr>
+            <a:spLocks noGrp="1"/>
+          </p:cNvSpPr>
+          <p:nvPr>
+            <p:ph idx="1"/>
+          </p:nvPr>
+        </p:nvSpPr>
+        <p:spPr/>
+        <p:txBody>
+          <a:bodyPr>
+            <a:normAutofit fontScale="92500" lnSpcReduction="10000"/>
+          </a:bodyPr>
+          <a:lstStyle/>
+          <a:p>
+            <a:pPr marL="45720" indent="0">
+              <a:buNone/>
+            </a:pPr>
+            <a:r>
+              <a:rPr lang="en-US" b="1" dirty="0" smtClean="0"/>
+              <a:t>G</a:t>
+            </a:r>
+            <a:r>
+              <a:rPr lang="en-US" dirty="0" smtClean="0"/>
+              <a:t> </a:t>
+            </a:r>
+            <a:r>
+              <a:rPr lang="en-US" dirty="0"/>
+              <a:t>is a graph</a:t>
+            </a:r>
+          </a:p>
+          <a:p>
+            <a:pPr marL="45720" indent="0">
+              <a:buNone/>
+            </a:pPr>
+            <a:r>
+              <a:rPr lang="en-US" dirty="0" smtClean="0"/>
+              <a:t>add </a:t>
+            </a:r>
+            <a:r>
+              <a:rPr lang="en-US" dirty="0"/>
+              <a:t>loops to </a:t>
+            </a:r>
+            <a:r>
+              <a:rPr lang="en-US" b="1" dirty="0"/>
+              <a:t>G</a:t>
+            </a:r>
+            <a:r>
+              <a:rPr lang="en-US" dirty="0"/>
+              <a:t>                             # see below </a:t>
+            </a:r>
+          </a:p>
+          <a:p>
+            <a:pPr marL="45720" indent="0">
+              <a:buNone/>
+            </a:pPr>
+            <a:r>
+              <a:rPr lang="en-US" dirty="0"/>
+              <a:t>set </a:t>
+            </a:r>
+            <a:r>
+              <a:rPr lang="en-US" dirty="0" err="1"/>
+              <a:t>Γ</a:t>
+            </a:r>
+            <a:r>
+              <a:rPr lang="en-US" dirty="0"/>
+              <a:t> to some value                     </a:t>
+            </a:r>
+            <a:r>
+              <a:rPr lang="en-US" dirty="0" smtClean="0"/>
+              <a:t># </a:t>
+            </a:r>
+            <a:r>
+              <a:rPr lang="en-US" dirty="0"/>
+              <a:t>affects granularity</a:t>
+            </a:r>
+          </a:p>
+          <a:p>
+            <a:pPr marL="45720" indent="0">
+              <a:buNone/>
+            </a:pPr>
+            <a:r>
+              <a:rPr lang="en-US" dirty="0"/>
+              <a:t>set </a:t>
+            </a:r>
+            <a:r>
+              <a:rPr lang="en-US" b="1" dirty="0"/>
+              <a:t>M_1</a:t>
+            </a:r>
+            <a:r>
+              <a:rPr lang="en-US" dirty="0"/>
+              <a:t> to be the matrix of random walks on </a:t>
+            </a:r>
+            <a:r>
+              <a:rPr lang="en-US" b="1" dirty="0"/>
+              <a:t>G</a:t>
+            </a:r>
+            <a:endParaRPr lang="en-US" dirty="0"/>
+          </a:p>
+          <a:p>
+            <a:pPr marL="45720" indent="0">
+              <a:buNone/>
+            </a:pPr>
+            <a:r>
+              <a:rPr lang="en-US" b="1" dirty="0"/>
+              <a:t> </a:t>
+            </a:r>
+            <a:endParaRPr lang="en-US" dirty="0"/>
+          </a:p>
+          <a:p>
+            <a:pPr marL="45720" indent="0">
+              <a:buNone/>
+            </a:pPr>
+            <a:r>
+              <a:rPr lang="en-US" dirty="0" smtClean="0"/>
+              <a:t>while </a:t>
+            </a:r>
+            <a:r>
+              <a:rPr lang="en-US" dirty="0"/>
+              <a:t>(change) {      </a:t>
+            </a:r>
+            <a:endParaRPr lang="en-US" dirty="0" smtClean="0"/>
+          </a:p>
+          <a:p>
+            <a:pPr marL="320040" lvl="1" indent="0">
+              <a:buNone/>
+            </a:pPr>
+            <a:r>
+              <a:rPr lang="en-US" b="1" dirty="0" smtClean="0"/>
+              <a:t>M_2</a:t>
+            </a:r>
+            <a:r>
+              <a:rPr lang="en-US" dirty="0" smtClean="0"/>
+              <a:t> </a:t>
+            </a:r>
+            <a:r>
+              <a:rPr lang="en-US" dirty="0"/>
+              <a:t>=  </a:t>
+            </a:r>
+            <a:r>
+              <a:rPr lang="en-US" b="1" dirty="0"/>
+              <a:t>M_1</a:t>
+            </a:r>
+            <a:r>
+              <a:rPr lang="en-US" dirty="0"/>
+              <a:t> * </a:t>
+            </a:r>
+            <a:r>
+              <a:rPr lang="en-US" b="1" dirty="0"/>
+              <a:t>M_1</a:t>
+            </a:r>
+            <a:r>
+              <a:rPr lang="en-US" dirty="0"/>
+              <a:t>                        #  expansion         </a:t>
+            </a:r>
+          </a:p>
+          <a:p>
+            <a:pPr marL="320040" lvl="1" indent="0">
+              <a:buNone/>
+            </a:pPr>
+            <a:r>
+              <a:rPr lang="en-US" b="1" dirty="0"/>
+              <a:t>M_1</a:t>
+            </a:r>
+            <a:r>
+              <a:rPr lang="en-US" dirty="0"/>
+              <a:t> =  </a:t>
+            </a:r>
+            <a:r>
+              <a:rPr lang="en-US" dirty="0" err="1"/>
+              <a:t>Γ</a:t>
+            </a:r>
+            <a:r>
+              <a:rPr lang="en-US" dirty="0"/>
+              <a:t>(</a:t>
+            </a:r>
+            <a:r>
+              <a:rPr lang="en-US" b="1" dirty="0"/>
+              <a:t>M_2</a:t>
+            </a:r>
+            <a:r>
+              <a:rPr lang="en-US" dirty="0"/>
+              <a:t>)                          </a:t>
+            </a:r>
+            <a:r>
+              <a:rPr lang="en-US" dirty="0" smtClean="0"/>
+              <a:t>    </a:t>
+            </a:r>
+            <a:r>
+              <a:rPr lang="en-US" dirty="0"/>
+              <a:t>#  inflation</a:t>
+            </a:r>
+          </a:p>
+          <a:p>
+            <a:pPr marL="320040" lvl="1" indent="0">
+              <a:buNone/>
+            </a:pPr>
+            <a:r>
+              <a:rPr lang="en-US" dirty="0"/>
+              <a:t>change   =  difference(</a:t>
+            </a:r>
+            <a:r>
+              <a:rPr lang="en-US" b="1" dirty="0"/>
+              <a:t>M_1</a:t>
+            </a:r>
+            <a:r>
+              <a:rPr lang="en-US" dirty="0"/>
+              <a:t>, </a:t>
+            </a:r>
+            <a:r>
+              <a:rPr lang="en-US" b="1" dirty="0"/>
+              <a:t>M_2</a:t>
+            </a:r>
+            <a:r>
+              <a:rPr lang="en-US" dirty="0"/>
+              <a:t>)    </a:t>
+            </a:r>
+          </a:p>
+          <a:p>
+            <a:pPr marL="45720" indent="0">
+              <a:buNone/>
+            </a:pPr>
+            <a:r>
+              <a:rPr lang="en-US" dirty="0"/>
+              <a:t>}</a:t>
+            </a:r>
+          </a:p>
+          <a:p>
+            <a:pPr marL="45720" indent="0">
+              <a:buNone/>
+            </a:pPr>
+            <a:r>
+              <a:rPr lang="en-US" dirty="0" smtClean="0"/>
+              <a:t>set </a:t>
+            </a:r>
+            <a:r>
+              <a:rPr lang="en-US" dirty="0"/>
+              <a:t>CLUSTERING as the components of </a:t>
+            </a:r>
+            <a:r>
+              <a:rPr lang="en-US" b="1" dirty="0"/>
+              <a:t>M_1</a:t>
+            </a:r>
+            <a:r>
+              <a:rPr lang="en-US" dirty="0"/>
+              <a:t>    #  see below</a:t>
+            </a:r>
+          </a:p>
+        </p:txBody>
+      </p:sp>
+    </p:spTree>
+    <p:extLst>
+      <p:ext uri="{BB962C8B-B14F-4D97-AF65-F5344CB8AC3E}">
+        <p14:creationId xmlns:p14="http://schemas.microsoft.com/office/powerpoint/2010/main" val="3032023052"/>
+      </p:ext>
+    </p:extLst>
+  </p:cSld>
+  <p:clrMapOvr>
+    <a:masterClrMapping/>
+  </p:clrMapOvr>
+</p:sld>
+</file>
+
+<file path=ppt/slides/slide14.xml><?xml version="1.0" encoding="utf-8"?>
+<p:sld xmlns:a="http://schemas.openxmlformats.org/drawingml/2006/main" xmlns:r="http://schemas.openxmlformats.org/officeDocument/2006/relationships" xmlns:p="http://schemas.openxmlformats.org/presentationml/2006/main">
+  <p:cSld>
+    <p:spTree>
+      <p:nvGrpSpPr>
+        <p:cNvPr id="1" name=""/>
+        <p:cNvGrpSpPr/>
+        <p:nvPr/>
+      </p:nvGrpSpPr>
+      <p:grpSpPr>
+        <a:xfrm>
+          <a:off x="0" y="0"/>
+          <a:ext cx="0" cy="0"/>
+          <a:chOff x="0" y="0"/>
+          <a:chExt cx="0" cy="0"/>
+        </a:xfrm>
+      </p:grpSpPr>
+      <p:sp>
+        <p:nvSpPr>
+          <p:cNvPr id="2" name="Title 1"/>
+          <p:cNvSpPr>
+            <a:spLocks noGrp="1"/>
+          </p:cNvSpPr>
+          <p:nvPr>
+            <p:ph type="title"/>
+          </p:nvPr>
+        </p:nvSpPr>
+        <p:spPr>
+          <a:xfrm>
+            <a:off x="914400" y="526576"/>
+            <a:ext cx="7315200" cy="1154097"/>
+          </a:xfrm>
+        </p:spPr>
+        <p:txBody>
+          <a:bodyPr/>
+          <a:lstStyle/>
+          <a:p>
+            <a:r>
+              <a:rPr lang="en-US" dirty="0" smtClean="0"/>
+              <a:t>Expansion</a:t>
+            </a:r>
+            <a:endParaRPr lang="en-US" dirty="0"/>
+          </a:p>
+        </p:txBody>
+      </p:sp>
+      <p:pic>
+        <p:nvPicPr>
+          <p:cNvPr id="4" name="Content Placeholder 3"/>
+          <p:cNvPicPr>
+            <a:picLocks noGrp="1" noChangeAspect="1"/>
+          </p:cNvPicPr>
+          <p:nvPr>
+            <p:ph idx="1"/>
+          </p:nvPr>
+        </p:nvPicPr>
+        <p:blipFill rotWithShape="1">
+          <a:blip r:embed="rId2"/>
+          <a:srcRect l="-3717" r="-2236"/>
+          <a:stretch/>
+        </p:blipFill>
+        <p:spPr>
+          <a:xfrm>
+            <a:off x="2823225" y="1899825"/>
+            <a:ext cx="3127589" cy="4524952"/>
+          </a:xfrm>
+          <a:prstGeom prst="rect">
+            <a:avLst/>
+          </a:prstGeom>
+          <a:noFill/>
+          <a:ln>
+            <a:noFill/>
+          </a:ln>
+        </p:spPr>
+      </p:pic>
+    </p:spTree>
+    <p:extLst>
+      <p:ext uri="{BB962C8B-B14F-4D97-AF65-F5344CB8AC3E}">
+        <p14:creationId xmlns:p14="http://schemas.microsoft.com/office/powerpoint/2010/main" val="264445753"/>
+      </p:ext>
+    </p:extLst>
+  </p:cSld>
+  <p:clrMapOvr>
+    <a:masterClrMapping/>
+  </p:clrMapOvr>
+</p:sld>
+</file>
+
+<file path=ppt/slides/slide15.xml><?xml version="1.0" encoding="utf-8"?>
+<p:sld xmlns:a="http://schemas.openxmlformats.org/drawingml/2006/main" xmlns:r="http://schemas.openxmlformats.org/officeDocument/2006/relationships" xmlns:p="http://schemas.openxmlformats.org/presentationml/2006/main">
+  <p:cSld>
+    <p:spTree>
+      <p:nvGrpSpPr>
+        <p:cNvPr id="1" name=""/>
+        <p:cNvGrpSpPr/>
+        <p:nvPr/>
+      </p:nvGrpSpPr>
+      <p:grpSpPr>
+        <a:xfrm>
+          <a:off x="0" y="0"/>
+          <a:ext cx="0" cy="0"/>
+          <a:chOff x="0" y="0"/>
+          <a:chExt cx="0" cy="0"/>
+        </a:xfrm>
+      </p:grpSpPr>
+      <p:sp>
+        <p:nvSpPr>
+          <p:cNvPr id="2" name="Title 1"/>
+          <p:cNvSpPr>
+            <a:spLocks noGrp="1"/>
+          </p:cNvSpPr>
+          <p:nvPr>
+            <p:ph type="title"/>
+          </p:nvPr>
+        </p:nvSpPr>
+        <p:spPr>
+          <a:xfrm>
+            <a:off x="914400" y="243178"/>
+            <a:ext cx="7315200" cy="1154097"/>
+          </a:xfrm>
+        </p:spPr>
+        <p:txBody>
+          <a:bodyPr/>
+          <a:lstStyle/>
+          <a:p>
+            <a:r>
+              <a:rPr lang="en-US" dirty="0" smtClean="0"/>
+              <a:t>Inflation</a:t>
+            </a:r>
+            <a:endParaRPr lang="en-US" dirty="0"/>
+          </a:p>
+        </p:txBody>
+      </p:sp>
+      <p:pic>
+        <p:nvPicPr>
+          <p:cNvPr id="4" name="Content Placeholder 3"/>
+          <p:cNvPicPr>
+            <a:picLocks noGrp="1" noChangeAspect="1"/>
+          </p:cNvPicPr>
+          <p:nvPr>
+            <p:ph idx="1"/>
+          </p:nvPr>
+        </p:nvPicPr>
+        <p:blipFill rotWithShape="1">
+          <a:blip r:embed="rId2"/>
+          <a:srcRect l="-3370" r="-2578"/>
+          <a:stretch/>
+        </p:blipFill>
+        <p:spPr>
+          <a:xfrm>
+            <a:off x="2592331" y="1637418"/>
+            <a:ext cx="3358484" cy="4828284"/>
+          </a:xfrm>
+        </p:spPr>
+      </p:pic>
+    </p:spTree>
+    <p:extLst>
+      <p:ext uri="{BB962C8B-B14F-4D97-AF65-F5344CB8AC3E}">
+        <p14:creationId xmlns:p14="http://schemas.microsoft.com/office/powerpoint/2010/main" val="3275273811"/>
+      </p:ext>
+    </p:extLst>
+  </p:cSld>
+  <p:clrMapOvr>
+    <a:masterClrMapping/>
+  </p:clrMapOvr>
+</p:sld>
+</file>
+
+<file path=ppt/slides/slide16.xml><?xml version="1.0" encoding="utf-8"?>
+<p:sld xmlns:a="http://schemas.openxmlformats.org/drawingml/2006/main" xmlns:r="http://schemas.openxmlformats.org/officeDocument/2006/relationships" xmlns:p="http://schemas.openxmlformats.org/presentationml/2006/main">
+  <p:cSld>
+    <p:spTree>
+      <p:nvGrpSpPr>
+        <p:cNvPr id="1" name=""/>
+        <p:cNvGrpSpPr/>
+        <p:nvPr/>
+      </p:nvGrpSpPr>
+      <p:grpSpPr>
+        <a:xfrm>
+          <a:off x="0" y="0"/>
+          <a:ext cx="0" cy="0"/>
+          <a:chOff x="0" y="0"/>
+          <a:chExt cx="0" cy="0"/>
+        </a:xfrm>
+      </p:grpSpPr>
+      <p:sp>
+        <p:nvSpPr>
+          <p:cNvPr id="2" name="Title 1"/>
+          <p:cNvSpPr>
+            <a:spLocks noGrp="1"/>
+          </p:cNvSpPr>
+          <p:nvPr>
+            <p:ph type="title"/>
+          </p:nvPr>
+        </p:nvSpPr>
+        <p:spPr/>
+        <p:txBody>
+          <a:bodyPr/>
+          <a:lstStyle/>
+          <a:p>
+            <a:r>
+              <a:rPr lang="en-US" dirty="0" smtClean="0"/>
+              <a:t>Finding cliques</a:t>
+            </a:r>
+            <a:endParaRPr lang="en-US" dirty="0"/>
+          </a:p>
+        </p:txBody>
+      </p:sp>
+      <p:sp>
+        <p:nvSpPr>
+          <p:cNvPr id="3" name="Content Placeholder 2"/>
+          <p:cNvSpPr>
+            <a:spLocks noGrp="1"/>
+          </p:cNvSpPr>
+          <p:nvPr>
+            <p:ph idx="1"/>
+          </p:nvPr>
+        </p:nvSpPr>
+        <p:spPr/>
+        <p:txBody>
+          <a:bodyPr/>
+          <a:lstStyle/>
+          <a:p>
+            <a:r>
+              <a:rPr lang="en-US" dirty="0" smtClean="0"/>
+              <a:t>Check each node to see if it belongs to a clique</a:t>
+            </a:r>
+          </a:p>
+          <a:p>
+            <a:r>
+              <a:rPr lang="en-US" dirty="0" smtClean="0"/>
+              <a:t>Apply a greedy approach </a:t>
+            </a:r>
+          </a:p>
+          <a:p>
+            <a:pPr lvl="1"/>
+            <a:r>
+              <a:rPr lang="en-US" dirty="0"/>
+              <a:t>D</a:t>
+            </a:r>
+            <a:r>
+              <a:rPr lang="en-US" dirty="0" smtClean="0"/>
+              <a:t>eleting a node on the </a:t>
+            </a:r>
+            <a:r>
+              <a:rPr lang="en-US" dirty="0" err="1" smtClean="0"/>
+              <a:t>subgraph</a:t>
+            </a:r>
+            <a:r>
+              <a:rPr lang="en-US" dirty="0" smtClean="0"/>
+              <a:t> with the least # of edges</a:t>
+            </a:r>
+          </a:p>
+          <a:p>
+            <a:pPr lvl="1"/>
+            <a:r>
+              <a:rPr lang="en-US" dirty="0" smtClean="0"/>
+              <a:t>If there is a tie then delete the least weight of edges</a:t>
+            </a:r>
+            <a:endParaRPr lang="en-US" dirty="0"/>
+          </a:p>
+        </p:txBody>
+      </p:sp>
+    </p:spTree>
+    <p:extLst>
+      <p:ext uri="{BB962C8B-B14F-4D97-AF65-F5344CB8AC3E}">
+        <p14:creationId xmlns:p14="http://schemas.microsoft.com/office/powerpoint/2010/main" val="2331548223"/>
+      </p:ext>
+    </p:extLst>
+  </p:cSld>
+  <p:clrMapOvr>
+    <a:masterClrMapping/>
+  </p:clrMapOvr>
+</p:sld>
+</file>
+
+<file path=ppt/slides/slide17.xml><?xml version="1.0" encoding="utf-8"?>
+<p:sld xmlns:a="http://schemas.openxmlformats.org/drawingml/2006/main" xmlns:r="http://schemas.openxmlformats.org/officeDocument/2006/relationships" xmlns:p="http://schemas.openxmlformats.org/presentationml/2006/main">
+  <p:cSld>
+    <p:spTree>
+      <p:nvGrpSpPr>
+        <p:cNvPr id="1" name=""/>
+        <p:cNvGrpSpPr/>
+        <p:nvPr/>
+      </p:nvGrpSpPr>
+      <p:grpSpPr>
+        <a:xfrm>
+          <a:off x="0" y="0"/>
+          <a:ext cx="0" cy="0"/>
+          <a:chOff x="0" y="0"/>
+          <a:chExt cx="0" cy="0"/>
+        </a:xfrm>
+      </p:grpSpPr>
+      <p:sp>
+        <p:nvSpPr>
+          <p:cNvPr id="2" name="Title 1"/>
+          <p:cNvSpPr>
+            <a:spLocks noGrp="1"/>
+          </p:cNvSpPr>
+          <p:nvPr>
+            <p:ph type="title"/>
+          </p:nvPr>
+        </p:nvSpPr>
+        <p:spPr/>
+        <p:txBody>
+          <a:bodyPr>
+            <a:normAutofit fontScale="90000"/>
+          </a:bodyPr>
+          <a:lstStyle/>
+          <a:p>
+            <a:r>
+              <a:rPr lang="en-US" dirty="0" smtClean="0"/>
+              <a:t>Example of the greedy method to finding a clique</a:t>
+            </a:r>
+            <a:endParaRPr lang="en-US" dirty="0"/>
+          </a:p>
+        </p:txBody>
+      </p:sp>
+      <p:pic>
+        <p:nvPicPr>
+          <p:cNvPr id="4" name="Content Placeholder 3"/>
+          <p:cNvPicPr>
+            <a:picLocks noChangeAspect="1"/>
+          </p:cNvPicPr>
+          <p:nvPr/>
+        </p:nvPicPr>
+        <p:blipFill>
+          <a:blip r:embed="rId2"/>
+          <a:srcRect t="-25033" b="-25033"/>
+          <a:stretch>
+            <a:fillRect/>
+          </a:stretch>
+        </p:blipFill>
+        <p:spPr>
+          <a:xfrm>
+            <a:off x="914400" y="2922233"/>
+            <a:ext cx="7315200" cy="3539527"/>
+          </a:xfrm>
+          <a:prstGeom prst="rect">
+            <a:avLst/>
+          </a:prstGeom>
+        </p:spPr>
+      </p:pic>
+    </p:spTree>
+    <p:extLst>
+      <p:ext uri="{BB962C8B-B14F-4D97-AF65-F5344CB8AC3E}">
+        <p14:creationId xmlns:p14="http://schemas.microsoft.com/office/powerpoint/2010/main" val="1278863060"/>
+      </p:ext>
+    </p:extLst>
+  </p:cSld>
+  <p:clrMapOvr>
+    <a:masterClrMapping/>
+  </p:clrMapOvr>
+</p:sld>
+</file>
+
+<file path=ppt/slides/slide18.xml><?xml version="1.0" encoding="utf-8"?>
+<p:sld xmlns:a="http://schemas.openxmlformats.org/drawingml/2006/main" xmlns:r="http://schemas.openxmlformats.org/officeDocument/2006/relationships" xmlns:p="http://schemas.openxmlformats.org/presentationml/2006/main">
+  <p:cSld>
+    <p:spTree>
+      <p:nvGrpSpPr>
+        <p:cNvPr id="1" name=""/>
+        <p:cNvGrpSpPr/>
+        <p:nvPr/>
+      </p:nvGrpSpPr>
+      <p:grpSpPr>
+        <a:xfrm>
+          <a:off x="0" y="0"/>
+          <a:ext cx="0" cy="0"/>
+          <a:chOff x="0" y="0"/>
+          <a:chExt cx="0" cy="0"/>
+        </a:xfrm>
+      </p:grpSpPr>
+      <p:sp>
+        <p:nvSpPr>
+          <p:cNvPr id="2" name="Title 1"/>
+          <p:cNvSpPr>
+            <a:spLocks noGrp="1"/>
+          </p:cNvSpPr>
+          <p:nvPr>
+            <p:ph type="title"/>
+          </p:nvPr>
+        </p:nvSpPr>
+        <p:spPr/>
+        <p:txBody>
+          <a:bodyPr/>
+          <a:lstStyle/>
+          <a:p>
+            <a:r>
+              <a:rPr lang="en-US" dirty="0" smtClean="0"/>
+              <a:t>Merge cliques</a:t>
+            </a:r>
+            <a:endParaRPr lang="en-US" dirty="0"/>
+          </a:p>
+        </p:txBody>
+      </p:sp>
+      <p:pic>
+        <p:nvPicPr>
+          <p:cNvPr id="4" name="Content Placeholder 3"/>
+          <p:cNvPicPr>
+            <a:picLocks noGrp="1" noChangeAspect="1"/>
+          </p:cNvPicPr>
+          <p:nvPr>
+            <p:ph idx="1"/>
+          </p:nvPr>
+        </p:nvPicPr>
+        <p:blipFill>
+          <a:blip r:embed="rId2" cstate="print">
+            <a:extLst>
+              <a:ext uri="{28A0092B-C50C-407E-A947-70E740481C1C}">
+                <a14:useLocalDpi xmlns:a14="http://schemas.microsoft.com/office/drawing/2010/main"/>
+              </a:ext>
+            </a:extLst>
+          </a:blip>
+          <a:srcRect t="-75320" b="-75320"/>
+          <a:stretch>
+            <a:fillRect/>
+          </a:stretch>
+        </p:blipFill>
+        <p:spPr>
+          <a:xfrm>
+            <a:off x="1952119" y="2753170"/>
+            <a:ext cx="5353898" cy="2590533"/>
+          </a:xfrm>
+        </p:spPr>
+      </p:pic>
+      <p:sp>
+        <p:nvSpPr>
+          <p:cNvPr id="5" name="TextBox 4"/>
+          <p:cNvSpPr txBox="1"/>
+          <p:nvPr/>
+        </p:nvSpPr>
+        <p:spPr>
+          <a:xfrm>
+            <a:off x="1952119" y="5006721"/>
+            <a:ext cx="5352585" cy="1200329"/>
+          </a:xfrm>
+          <a:prstGeom prst="rect">
+            <a:avLst/>
+          </a:prstGeom>
+          <a:noFill/>
+        </p:spPr>
+        <p:txBody>
+          <a:bodyPr wrap="square" rtlCol="0">
+            <a:spAutoFit/>
+          </a:bodyPr>
+          <a:lstStyle/>
+          <a:p>
+            <a:pPr marL="285750" indent="-285750">
+              <a:buFont typeface="Arial"/>
+              <a:buChar char="•"/>
+            </a:pPr>
+            <a:r>
+              <a:rPr lang="en-US" dirty="0" smtClean="0"/>
+              <a:t>Merge cliques when ratio of shared nodes is greater than a threshold of:</a:t>
+            </a:r>
+          </a:p>
+          <a:p>
+            <a:pPr marL="742950" lvl="1" indent="-285750">
+              <a:buFont typeface="Arial"/>
+              <a:buChar char="•"/>
+            </a:pPr>
+            <a:r>
+              <a:rPr lang="en-US" dirty="0" err="1" smtClean="0"/>
+              <a:t>r</a:t>
+            </a:r>
+            <a:r>
+              <a:rPr lang="en-US" baseline="-25000" dirty="0" err="1" smtClean="0"/>
+              <a:t>ab</a:t>
+            </a:r>
+            <a:r>
+              <a:rPr lang="en-US" dirty="0" smtClean="0"/>
+              <a:t> &gt; .9</a:t>
+            </a:r>
+          </a:p>
+          <a:p>
+            <a:pPr marL="742950" lvl="1" indent="-285750">
+              <a:buFont typeface="Arial"/>
+              <a:buChar char="•"/>
+            </a:pPr>
+            <a:r>
+              <a:rPr lang="en-US" dirty="0" err="1" smtClean="0"/>
+              <a:t>R</a:t>
+            </a:r>
+            <a:r>
+              <a:rPr lang="en-US" baseline="-25000" dirty="0" err="1" smtClean="0"/>
+              <a:t>ab</a:t>
+            </a:r>
+            <a:r>
+              <a:rPr lang="en-US" dirty="0" smtClean="0"/>
+              <a:t> &gt; .7</a:t>
+            </a:r>
+            <a:endParaRPr lang="en-US" dirty="0"/>
+          </a:p>
+        </p:txBody>
+      </p:sp>
+    </p:spTree>
+    <p:extLst>
+      <p:ext uri="{BB962C8B-B14F-4D97-AF65-F5344CB8AC3E}">
+        <p14:creationId xmlns:p14="http://schemas.microsoft.com/office/powerpoint/2010/main" val="2883952508"/>
+      </p:ext>
+    </p:extLst>
+  </p:cSld>
+  <p:clrMapOvr>
+    <a:masterClrMapping/>
+  </p:clrMapOvr>
+</p:sld>
+</file>
+
+<file path=ppt/slides/slide19.xml><?xml version="1.0" encoding="utf-8"?>
+<p:sld xmlns:a="http://schemas.openxmlformats.org/drawingml/2006/main" xmlns:r="http://schemas.openxmlformats.org/officeDocument/2006/relationships" xmlns:p="http://schemas.openxmlformats.org/presentationml/2006/main">
+  <p:cSld>
+    <p:spTree>
+      <p:nvGrpSpPr>
+        <p:cNvPr id="1" name=""/>
+        <p:cNvGrpSpPr/>
+        <p:nvPr/>
+      </p:nvGrpSpPr>
+      <p:grpSpPr>
+        <a:xfrm>
+          <a:off x="0" y="0"/>
+          <a:ext cx="0" cy="0"/>
+          <a:chOff x="0" y="0"/>
+          <a:chExt cx="0" cy="0"/>
+        </a:xfrm>
+      </p:grpSpPr>
+      <p:sp>
+        <p:nvSpPr>
+          <p:cNvPr id="2" name="Title 1"/>
+          <p:cNvSpPr>
+            <a:spLocks noGrp="1"/>
+          </p:cNvSpPr>
+          <p:nvPr>
+            <p:ph type="title"/>
+          </p:nvPr>
+        </p:nvSpPr>
+        <p:spPr/>
+        <p:txBody>
+          <a:bodyPr/>
+          <a:lstStyle/>
+          <a:p>
+            <a:r>
+              <a:rPr lang="en-US" dirty="0" smtClean="0"/>
+              <a:t>Ranking clusters</a:t>
+            </a:r>
+            <a:endParaRPr lang="en-US" dirty="0"/>
+          </a:p>
+        </p:txBody>
+      </p:sp>
+      <p:pic>
+        <p:nvPicPr>
+          <p:cNvPr id="4" name="Content Placeholder 3"/>
+          <p:cNvPicPr>
+            <a:picLocks noGrp="1" noChangeAspect="1"/>
+          </p:cNvPicPr>
+          <p:nvPr>
+            <p:ph idx="1"/>
+          </p:nvPr>
+        </p:nvPicPr>
+        <p:blipFill rotWithShape="1">
+          <a:blip r:embed="rId2"/>
+          <a:srcRect t="-1000" b="2256"/>
+          <a:stretch/>
+        </p:blipFill>
+        <p:spPr>
+          <a:xfrm>
+            <a:off x="914400" y="2986189"/>
+            <a:ext cx="7315200" cy="1270048"/>
+          </a:xfrm>
+        </p:spPr>
+      </p:pic>
+    </p:spTree>
+    <p:extLst>
+      <p:ext uri="{BB962C8B-B14F-4D97-AF65-F5344CB8AC3E}">
+        <p14:creationId xmlns:p14="http://schemas.microsoft.com/office/powerpoint/2010/main" val="1474404250"/>
+      </p:ext>
+    </p:extLst>
+  </p:cSld>
+  <p:clrMapOvr>
+    <a:masterClrMapping/>
+  </p:clrMapOvr>
+</p:sld>
+</file>
+
 <file path=ppt/slides/slide2.xml><?xml version="1.0" encoding="utf-8"?>
 <p:sld xmlns:a="http://schemas.openxmlformats.org/drawingml/2006/main" xmlns:r="http://schemas.openxmlformats.org/officeDocument/2006/relationships" xmlns:p="http://schemas.openxmlformats.org/presentationml/2006/main">
   <p:cSld>
@@ -3802,50 +4993,51 @@
         </p:nvSpPr>
         <p:spPr/>
         <p:txBody>
-          <a:bodyPr/>
-          <a:lstStyle/>
-          <a:p>
-            <a:r>
-              <a:rPr lang="en-US" dirty="0" smtClean="0"/>
-              <a:t>Motif finding programs</a:t>
-            </a:r>
-            <a:endParaRPr lang="en-US" dirty="0"/>
-          </a:p>
-        </p:txBody>
-      </p:sp>
-      <p:sp>
-        <p:nvSpPr>
-          <p:cNvPr id="3" name="Content Placeholder 2"/>
-          <p:cNvSpPr>
-            <a:spLocks noGrp="1"/>
-          </p:cNvSpPr>
+          <a:bodyPr>
+            <a:normAutofit/>
+          </a:bodyPr>
+          <a:lstStyle/>
+          <a:p>
+            <a:r>
+              <a:rPr lang="en-US" smtClean="0"/>
+              <a:t>Flowchart</a:t>
+            </a:r>
+            <a:endParaRPr lang="en-US"/>
+          </a:p>
+        </p:txBody>
+      </p:sp>
+      <p:pic>
+        <p:nvPicPr>
+          <p:cNvPr id="4" name="Content Placeholder 3"/>
+          <p:cNvPicPr>
+            <a:picLocks noGrp="1" noChangeAspect="1"/>
+          </p:cNvPicPr>
           <p:nvPr>
             <p:ph idx="1"/>
           </p:nvPr>
-        </p:nvSpPr>
-        <p:spPr/>
-        <p:txBody>
-          <a:bodyPr/>
-          <a:lstStyle/>
-          <a:p>
-            <a:r>
-              <a:rPr lang="en-US" dirty="0" smtClean="0"/>
-              <a:t>MEME</a:t>
-            </a:r>
-          </a:p>
-          <a:p>
-            <a:r>
-              <a:rPr lang="en-US" dirty="0" err="1" smtClean="0"/>
-              <a:t>Bioprospector</a:t>
-            </a:r>
-            <a:endParaRPr lang="en-US" dirty="0"/>
-          </a:p>
-        </p:txBody>
-      </p:sp>
+        </p:nvPicPr>
+        <p:blipFill rotWithShape="1">
+          <a:blip r:embed="rId2" cstate="print">
+            <a:extLst>
+              <a:ext uri="{28A0092B-C50C-407E-A947-70E740481C1C}">
+                <a14:useLocalDpi xmlns:a14="http://schemas.microsoft.com/office/drawing/2010/main"/>
+              </a:ext>
+            </a:extLst>
+          </a:blip>
+          <a:srcRect l="-2066" t="19946" r="-2444"/>
+          <a:stretch/>
+        </p:blipFill>
+        <p:spPr>
+          <a:xfrm>
+            <a:off x="3494923" y="1710892"/>
+            <a:ext cx="3316504" cy="4346558"/>
+          </a:xfrm>
+        </p:spPr>
+      </p:pic>
     </p:spTree>
     <p:extLst>
       <p:ext uri="{BB962C8B-B14F-4D97-AF65-F5344CB8AC3E}">
-        <p14:creationId xmlns:p14="http://schemas.microsoft.com/office/powerpoint/2010/main" val="135000761"/>
+        <p14:creationId xmlns:p14="http://schemas.microsoft.com/office/powerpoint/2010/main" val="29402018"/>
       </p:ext>
     </p:extLst>
   </p:cSld>
@@ -3889,7 +5081,7 @@
           <a:p>
             <a:r>
               <a:rPr lang="en-US" dirty="0" smtClean="0"/>
-              <a:t>Markov clustering algorithm</a:t>
+              <a:t>Motif finding programs</a:t>
             </a:r>
             <a:endParaRPr lang="en-US" dirty="0"/>
           </a:p>
@@ -3912,39 +5104,13 @@
           <a:p>
             <a:r>
               <a:rPr lang="en-US" dirty="0" smtClean="0"/>
-              <a:t>While (chaos &gt; .0001)</a:t>
-            </a:r>
-          </a:p>
-          <a:p>
-            <a:pPr lvl="1"/>
-            <a:r>
-              <a:rPr lang="en-US" dirty="0" smtClean="0"/>
-              <a:t>1) square matrix</a:t>
-            </a:r>
-          </a:p>
-          <a:p>
-            <a:pPr lvl="1"/>
-            <a:r>
-              <a:rPr lang="en-US" dirty="0" smtClean="0"/>
-              <a:t>2) chaos = inflate matrix</a:t>
-            </a:r>
-          </a:p>
-          <a:p>
-            <a:pPr lvl="2"/>
+              <a:t>MEME</a:t>
+            </a:r>
+          </a:p>
+          <a:p>
             <a:r>
               <a:rPr lang="en-US" dirty="0" err="1" smtClean="0"/>
-              <a:t>Hadamard</a:t>
-            </a:r>
-            <a:r>
-              <a:rPr lang="en-US" dirty="0" smtClean="0"/>
-              <a:t> power(I)</a:t>
-            </a:r>
-          </a:p>
-          <a:p>
-            <a:pPr lvl="2"/>
-            <a:r>
-              <a:rPr lang="en-US" dirty="0" smtClean="0"/>
-              <a:t>Normalize rows</a:t>
+              <a:t>BioProspector</a:t>
             </a:r>
             <a:endParaRPr lang="en-US" dirty="0"/>
           </a:p>
@@ -3953,7 +5119,7 @@
     </p:spTree>
     <p:extLst>
       <p:ext uri="{BB962C8B-B14F-4D97-AF65-F5344CB8AC3E}">
-        <p14:creationId xmlns:p14="http://schemas.microsoft.com/office/powerpoint/2010/main" val="1809247320"/>
+        <p14:creationId xmlns:p14="http://schemas.microsoft.com/office/powerpoint/2010/main" val="135000761"/>
       </p:ext>
     </p:extLst>
   </p:cSld>
@@ -3992,277 +5158,101 @@
         </p:nvSpPr>
         <p:spPr/>
         <p:txBody>
-          <a:bodyPr/>
-          <a:lstStyle/>
-          <a:p>
-            <a:r>
-              <a:rPr lang="en-US" dirty="0" smtClean="0"/>
-              <a:t>MCL </a:t>
-            </a:r>
-            <a:r>
-              <a:rPr lang="en-US" dirty="0" err="1" smtClean="0"/>
-              <a:t>pseudocode</a:t>
-            </a:r>
-            <a:endParaRPr lang="en-US" dirty="0"/>
-          </a:p>
-        </p:txBody>
-      </p:sp>
-      <p:sp>
-        <p:nvSpPr>
-          <p:cNvPr id="3" name="Content Placeholder 2"/>
-          <p:cNvSpPr>
-            <a:spLocks noGrp="1"/>
-          </p:cNvSpPr>
+          <a:bodyPr>
+            <a:normAutofit/>
+          </a:bodyPr>
+          <a:lstStyle/>
+          <a:p>
+            <a:r>
+              <a:rPr lang="en-US" smtClean="0"/>
+              <a:t>Flowchart</a:t>
+            </a:r>
+            <a:endParaRPr lang="en-US"/>
+          </a:p>
+        </p:txBody>
+      </p:sp>
+      <p:pic>
+        <p:nvPicPr>
+          <p:cNvPr id="4" name="Content Placeholder 3"/>
+          <p:cNvPicPr>
+            <a:picLocks noGrp="1" noChangeAspect="1"/>
+          </p:cNvPicPr>
           <p:nvPr>
             <p:ph idx="1"/>
           </p:nvPr>
-        </p:nvSpPr>
-        <p:spPr/>
-        <p:txBody>
-          <a:bodyPr>
-            <a:normAutofit fontScale="92500" lnSpcReduction="10000"/>
-          </a:bodyPr>
-          <a:lstStyle/>
-          <a:p>
-            <a:pPr marL="45720" indent="0">
-              <a:buNone/>
-            </a:pPr>
-            <a:r>
-              <a:rPr lang="en-US" b="1" dirty="0" smtClean="0"/>
-              <a:t>G</a:t>
-            </a:r>
-            <a:r>
-              <a:rPr lang="en-US" dirty="0" smtClean="0"/>
-              <a:t> </a:t>
-            </a:r>
-            <a:r>
-              <a:rPr lang="en-US" dirty="0"/>
-              <a:t>is a graph</a:t>
-            </a:r>
-          </a:p>
-          <a:p>
-            <a:pPr marL="45720" indent="0">
-              <a:buNone/>
-            </a:pPr>
-            <a:r>
-              <a:rPr lang="en-US" dirty="0" smtClean="0"/>
-              <a:t>add </a:t>
-            </a:r>
-            <a:r>
-              <a:rPr lang="en-US" dirty="0"/>
-              <a:t>loops to </a:t>
-            </a:r>
-            <a:r>
-              <a:rPr lang="en-US" b="1" dirty="0"/>
-              <a:t>G</a:t>
-            </a:r>
-            <a:r>
-              <a:rPr lang="en-US" dirty="0"/>
-              <a:t>                             # see below </a:t>
-            </a:r>
-          </a:p>
-          <a:p>
-            <a:pPr marL="45720" indent="0">
-              <a:buNone/>
-            </a:pPr>
-            <a:r>
-              <a:rPr lang="en-US" dirty="0"/>
-              <a:t>set </a:t>
-            </a:r>
-            <a:r>
-              <a:rPr lang="en-US" dirty="0" err="1"/>
-              <a:t>Γ</a:t>
-            </a:r>
-            <a:r>
-              <a:rPr lang="en-US" dirty="0"/>
-              <a:t> to some value                     </a:t>
-            </a:r>
-            <a:r>
-              <a:rPr lang="en-US" dirty="0" smtClean="0"/>
-              <a:t># </a:t>
-            </a:r>
-            <a:r>
-              <a:rPr lang="en-US" dirty="0"/>
-              <a:t>affects granularity</a:t>
-            </a:r>
-          </a:p>
-          <a:p>
-            <a:pPr marL="45720" indent="0">
-              <a:buNone/>
-            </a:pPr>
-            <a:r>
-              <a:rPr lang="en-US" dirty="0"/>
-              <a:t>set </a:t>
-            </a:r>
-            <a:r>
-              <a:rPr lang="en-US" b="1" dirty="0"/>
-              <a:t>M_1</a:t>
-            </a:r>
-            <a:r>
-              <a:rPr lang="en-US" dirty="0"/>
-              <a:t> to be the matrix of random walks on </a:t>
-            </a:r>
-            <a:r>
-              <a:rPr lang="en-US" b="1" dirty="0"/>
-              <a:t>G</a:t>
-            </a:r>
-            <a:endParaRPr lang="en-US" dirty="0"/>
-          </a:p>
-          <a:p>
-            <a:pPr marL="45720" indent="0">
-              <a:buNone/>
-            </a:pPr>
-            <a:r>
-              <a:rPr lang="en-US" b="1" dirty="0"/>
-              <a:t> </a:t>
-            </a:r>
-            <a:endParaRPr lang="en-US" dirty="0"/>
-          </a:p>
-          <a:p>
-            <a:pPr marL="45720" indent="0">
-              <a:buNone/>
-            </a:pPr>
-            <a:r>
-              <a:rPr lang="en-US" dirty="0" smtClean="0"/>
-              <a:t>while </a:t>
-            </a:r>
-            <a:r>
-              <a:rPr lang="en-US" dirty="0"/>
-              <a:t>(change) {      </a:t>
-            </a:r>
-            <a:endParaRPr lang="en-US" dirty="0" smtClean="0"/>
-          </a:p>
-          <a:p>
-            <a:pPr marL="320040" lvl="1" indent="0">
-              <a:buNone/>
-            </a:pPr>
-            <a:r>
-              <a:rPr lang="en-US" b="1" dirty="0" smtClean="0"/>
-              <a:t>M_2</a:t>
-            </a:r>
-            <a:r>
-              <a:rPr lang="en-US" dirty="0" smtClean="0"/>
-              <a:t> </a:t>
-            </a:r>
-            <a:r>
-              <a:rPr lang="en-US" dirty="0"/>
-              <a:t>=  </a:t>
-            </a:r>
-            <a:r>
-              <a:rPr lang="en-US" b="1" dirty="0"/>
-              <a:t>M_1</a:t>
-            </a:r>
-            <a:r>
-              <a:rPr lang="en-US" dirty="0"/>
-              <a:t> * </a:t>
-            </a:r>
-            <a:r>
-              <a:rPr lang="en-US" b="1" dirty="0"/>
-              <a:t>M_1</a:t>
-            </a:r>
-            <a:r>
-              <a:rPr lang="en-US" dirty="0"/>
-              <a:t>                        #  expansion         </a:t>
-            </a:r>
-          </a:p>
-          <a:p>
-            <a:pPr marL="320040" lvl="1" indent="0">
-              <a:buNone/>
-            </a:pPr>
-            <a:r>
-              <a:rPr lang="en-US" b="1" dirty="0"/>
-              <a:t>M_1</a:t>
-            </a:r>
-            <a:r>
-              <a:rPr lang="en-US" dirty="0"/>
-              <a:t> =  </a:t>
-            </a:r>
-            <a:r>
-              <a:rPr lang="en-US" dirty="0" err="1"/>
-              <a:t>Γ</a:t>
-            </a:r>
-            <a:r>
-              <a:rPr lang="en-US" dirty="0"/>
-              <a:t>(</a:t>
-            </a:r>
-            <a:r>
-              <a:rPr lang="en-US" b="1" dirty="0"/>
-              <a:t>M_2</a:t>
-            </a:r>
-            <a:r>
-              <a:rPr lang="en-US" dirty="0"/>
-              <a:t>)                          </a:t>
-            </a:r>
-            <a:r>
-              <a:rPr lang="en-US" dirty="0" smtClean="0"/>
-              <a:t>    </a:t>
-            </a:r>
-            <a:r>
-              <a:rPr lang="en-US" dirty="0"/>
-              <a:t>#  inflation</a:t>
-            </a:r>
-          </a:p>
-          <a:p>
-            <a:pPr marL="320040" lvl="1" indent="0">
-              <a:buNone/>
-            </a:pPr>
-            <a:r>
-              <a:rPr lang="en-US" dirty="0"/>
-              <a:t>change   =  difference(</a:t>
-            </a:r>
-            <a:r>
-              <a:rPr lang="en-US" b="1" dirty="0"/>
-              <a:t>M_1</a:t>
-            </a:r>
-            <a:r>
-              <a:rPr lang="en-US" dirty="0"/>
-              <a:t>, </a:t>
-            </a:r>
-            <a:r>
-              <a:rPr lang="en-US" b="1" dirty="0"/>
-              <a:t>M_2</a:t>
-            </a:r>
-            <a:r>
-              <a:rPr lang="en-US" dirty="0"/>
-              <a:t>)    </a:t>
-            </a:r>
-          </a:p>
-          <a:p>
-            <a:pPr marL="45720" indent="0">
-              <a:buNone/>
-            </a:pPr>
-            <a:r>
-              <a:rPr lang="en-US" dirty="0"/>
-              <a:t>}</a:t>
-            </a:r>
-          </a:p>
-          <a:p>
-            <a:pPr marL="45720" indent="0">
-              <a:buNone/>
-            </a:pPr>
-            <a:r>
-              <a:rPr lang="en-US" dirty="0" smtClean="0"/>
-              <a:t>set </a:t>
-            </a:r>
-            <a:r>
-              <a:rPr lang="en-US" dirty="0"/>
-              <a:t>CLUSTERING as the components of </a:t>
-            </a:r>
-            <a:r>
-              <a:rPr lang="en-US" b="1" dirty="0"/>
-              <a:t>M_1</a:t>
-            </a:r>
-            <a:r>
-              <a:rPr lang="en-US" dirty="0"/>
-              <a:t>    #  see below</a:t>
-            </a:r>
+        </p:nvPicPr>
+        <p:blipFill rotWithShape="1">
+          <a:blip r:embed="rId2" cstate="print">
+            <a:extLst>
+              <a:ext uri="{28A0092B-C50C-407E-A947-70E740481C1C}">
+                <a14:useLocalDpi xmlns:a14="http://schemas.microsoft.com/office/drawing/2010/main"/>
+              </a:ext>
+            </a:extLst>
+          </a:blip>
+          <a:srcRect l="-2066" t="19946" r="-2444"/>
+          <a:stretch/>
+        </p:blipFill>
+        <p:spPr>
+          <a:xfrm>
+            <a:off x="3494923" y="1710892"/>
+            <a:ext cx="3316504" cy="4346558"/>
+          </a:xfrm>
+        </p:spPr>
+      </p:pic>
+      <p:sp>
+        <p:nvSpPr>
+          <p:cNvPr id="3" name="Rectangle 2"/>
+          <p:cNvSpPr/>
+          <p:nvPr/>
+        </p:nvSpPr>
+        <p:spPr>
+          <a:xfrm>
+            <a:off x="3841267" y="2403646"/>
+            <a:ext cx="2476883" cy="577295"/>
+          </a:xfrm>
+          <a:prstGeom prst="rect">
+            <a:avLst/>
+          </a:prstGeom>
+          <a:noFill/>
+          <a:ln w="38100" cmpd="sng">
+            <a:solidFill>
+              <a:srgbClr val="FFB666"/>
+            </a:solidFill>
+          </a:ln>
+        </p:spPr>
+        <p:style>
+          <a:lnRef idx="1">
+            <a:schemeClr val="accent1"/>
+          </a:lnRef>
+          <a:fillRef idx="3">
+            <a:schemeClr val="accent1"/>
+          </a:fillRef>
+          <a:effectRef idx="2">
+            <a:schemeClr val="accent1"/>
+          </a:effectRef>
+          <a:fontRef idx="minor">
+            <a:schemeClr val="lt1"/>
+          </a:fontRef>
+        </p:style>
+        <p:txBody>
+          <a:bodyPr rtlCol="0" anchor="ctr"/>
+          <a:lstStyle/>
+          <a:p>
+            <a:pPr algn="ctr"/>
+            <a:endParaRPr lang="en-US">
+              <a:ln w="57150" cmpd="sng">
+                <a:solidFill>
+                  <a:schemeClr val="tx1"/>
+                </a:solidFill>
+              </a:ln>
+            </a:endParaRPr>
           </a:p>
         </p:txBody>
       </p:sp>
     </p:spTree>
     <p:extLst>
       <p:ext uri="{BB962C8B-B14F-4D97-AF65-F5344CB8AC3E}">
-        <p14:creationId xmlns:p14="http://schemas.microsoft.com/office/powerpoint/2010/main" val="3032023052"/>
+        <p14:creationId xmlns:p14="http://schemas.microsoft.com/office/powerpoint/2010/main" val="2698401936"/>
       </p:ext>
     </p:extLst>
   </p:cSld>
@@ -4306,7 +5296,11 @@
           <a:p>
             <a:r>
               <a:rPr lang="en-US" dirty="0" smtClean="0"/>
-              <a:t>Finding cliques</a:t>
+              <a:t>Profile matrix P</a:t>
+            </a:r>
+            <a:r>
+              <a:rPr lang="en-US" baseline="-25000" dirty="0" smtClean="0"/>
+              <a:t>M</a:t>
             </a:r>
             <a:endParaRPr lang="en-US" dirty="0"/>
           </a:p>
@@ -4314,7 +5308,97 @@
       </p:sp>
       <p:sp>
         <p:nvSpPr>
-          <p:cNvPr id="3" name="Content Placeholder 2"/>
+          <p:cNvPr id="9" name="TextBox 8"/>
+          <p:cNvSpPr txBox="1"/>
+          <p:nvPr/>
+        </p:nvSpPr>
+        <p:spPr>
+          <a:xfrm>
+            <a:off x="1124306" y="2980941"/>
+            <a:ext cx="6400800" cy="461665"/>
+          </a:xfrm>
+          <a:prstGeom prst="rect">
+            <a:avLst/>
+          </a:prstGeom>
+          <a:noFill/>
+        </p:spPr>
+        <p:txBody>
+          <a:bodyPr wrap="square" rtlCol="0">
+            <a:spAutoFit/>
+          </a:bodyPr>
+          <a:lstStyle/>
+          <a:p>
+            <a:r>
+              <a:rPr lang="en-US" sz="2400" dirty="0" smtClean="0"/>
+              <a:t>P</a:t>
+            </a:r>
+            <a:r>
+              <a:rPr lang="en-US" sz="2400" baseline="-25000" dirty="0" smtClean="0"/>
+              <a:t>M</a:t>
+            </a:r>
+            <a:r>
+              <a:rPr lang="en-US" sz="2400" dirty="0" smtClean="0"/>
+              <a:t> = (</a:t>
+            </a:r>
+            <a:r>
+              <a:rPr lang="en-US" sz="2400" dirty="0" err="1" smtClean="0"/>
+              <a:t>Prf</a:t>
+            </a:r>
+            <a:r>
+              <a:rPr lang="en-US" sz="2400" baseline="-25000" dirty="0" err="1" smtClean="0"/>
+              <a:t>M</a:t>
+            </a:r>
+            <a:r>
+              <a:rPr lang="en-US" sz="2400" dirty="0" smtClean="0"/>
+              <a:t>(</a:t>
+            </a:r>
+            <a:r>
+              <a:rPr lang="en-US" sz="2400" dirty="0" err="1" smtClean="0"/>
+              <a:t>b,i</a:t>
+            </a:r>
+            <a:r>
+              <a:rPr lang="en-US" sz="2400" dirty="0" smtClean="0"/>
+              <a:t>))</a:t>
+            </a:r>
+            <a:r>
+              <a:rPr lang="en-US" sz="2400" baseline="-25000" dirty="0" smtClean="0"/>
+              <a:t>4xL</a:t>
+            </a:r>
+            <a:r>
+              <a:rPr lang="en-US" sz="2400" dirty="0" smtClean="0"/>
+              <a:t> = (log(</a:t>
+            </a:r>
+            <a:r>
+              <a:rPr lang="en-US" sz="2400" dirty="0" err="1" smtClean="0"/>
+              <a:t>p</a:t>
+            </a:r>
+            <a:r>
+              <a:rPr lang="en-US" sz="2400" baseline="-25000" dirty="0" err="1" smtClean="0"/>
+              <a:t>M</a:t>
+            </a:r>
+            <a:r>
+              <a:rPr lang="en-US" sz="2400" dirty="0" smtClean="0"/>
+              <a:t>(</a:t>
+            </a:r>
+            <a:r>
+              <a:rPr lang="en-US" sz="2400" dirty="0" err="1" smtClean="0"/>
+              <a:t>b,i</a:t>
+            </a:r>
+            <a:r>
+              <a:rPr lang="en-US" sz="2400" dirty="0" smtClean="0"/>
+              <a:t>)/q(b)))</a:t>
+            </a:r>
+            <a:r>
+              <a:rPr lang="en-US" sz="2400" baseline="-25000" dirty="0" smtClean="0"/>
+              <a:t>4xL</a:t>
+            </a:r>
+            <a:endParaRPr lang="en-US" sz="2400" dirty="0"/>
+          </a:p>
+        </p:txBody>
+      </p:sp>
+      <p:sp>
+        <p:nvSpPr>
+          <p:cNvPr id="10" name="Content Placeholder 9"/>
           <p:cNvSpPr>
             <a:spLocks noGrp="1"/>
           </p:cNvSpPr>
@@ -4322,25 +5406,72 @@
             <p:ph idx="1"/>
           </p:nvPr>
         </p:nvSpPr>
-        <p:spPr/>
+        <p:spPr>
+          <a:xfrm>
+            <a:off x="914400" y="3778657"/>
+            <a:ext cx="7315200" cy="2530703"/>
+          </a:xfrm>
+        </p:spPr>
         <p:txBody>
           <a:bodyPr/>
           <a:lstStyle/>
           <a:p>
-            <a:endParaRPr lang="en-US"/>
+            <a:r>
+              <a:rPr lang="en-US" dirty="0" err="1" smtClean="0"/>
+              <a:t>p</a:t>
+            </a:r>
+            <a:r>
+              <a:rPr lang="en-US" baseline="-25000" dirty="0" err="1" smtClean="0"/>
+              <a:t>M</a:t>
+            </a:r>
+            <a:r>
+              <a:rPr lang="en-US" dirty="0" smtClean="0"/>
+              <a:t>(</a:t>
+            </a:r>
+            <a:r>
+              <a:rPr lang="en-US" dirty="0" err="1" smtClean="0"/>
+              <a:t>b,i</a:t>
+            </a:r>
+            <a:r>
+              <a:rPr lang="en-US" dirty="0" smtClean="0"/>
+              <a:t>) = probability of base b appearing at </a:t>
+            </a:r>
+            <a:r>
+              <a:rPr lang="en-US" dirty="0" err="1" smtClean="0"/>
+              <a:t>pos</a:t>
+            </a:r>
+            <a:r>
+              <a:rPr lang="en-US" dirty="0" smtClean="0"/>
+              <a:t> I</a:t>
+            </a:r>
+            <a:endParaRPr lang="en-US" dirty="0"/>
+          </a:p>
+          <a:p>
+            <a:r>
+              <a:rPr lang="en-US" dirty="0" smtClean="0"/>
+              <a:t>q(b)     = background probability of base b</a:t>
+            </a:r>
+            <a:endParaRPr lang="en-US" dirty="0"/>
           </a:p>
         </p:txBody>
       </p:sp>
     </p:spTree>
     <p:extLst>
       <p:ext uri="{BB962C8B-B14F-4D97-AF65-F5344CB8AC3E}">
-        <p14:creationId xmlns:p14="http://schemas.microsoft.com/office/powerpoint/2010/main" val="2331548223"/>
+        <p14:creationId xmlns:p14="http://schemas.microsoft.com/office/powerpoint/2010/main" val="2346183972"/>
       </p:ext>
     </p:extLst>
   </p:cSld>
   <p:clrMapOvr>
     <a:masterClrMapping/>
   </p:clrMapOvr>
+  <p:timing>
+    <p:tnLst>
+      <p:par>
+        <p:cTn xmlns:p14="http://schemas.microsoft.com/office/powerpoint/2010/main" id="1" dur="indefinite" restart="never" nodeType="tmRoot"/>
+      </p:par>
+    </p:tnLst>
+  </p:timing>
 </p:sld>
 </file>
 
@@ -4371,21 +5502,16 @@
             <p:ph type="title"/>
           </p:nvPr>
         </p:nvSpPr>
-        <p:spPr>
-          <a:xfrm>
-            <a:off x="914400" y="258840"/>
-            <a:ext cx="7315200" cy="1154097"/>
-          </a:xfrm>
-        </p:spPr>
+        <p:spPr/>
         <p:txBody>
           <a:bodyPr>
-            <a:normAutofit fontScale="90000"/>
+            <a:normAutofit/>
           </a:bodyPr>
           <a:lstStyle/>
           <a:p>
             <a:r>
               <a:rPr lang="en-US" dirty="0" smtClean="0"/>
-              <a:t>Example of multiple cliques in a  graph</a:t>
+              <a:t>Self-information</a:t>
             </a:r>
             <a:endParaRPr lang="en-US" dirty="0"/>
           </a:p>
@@ -4393,51 +5519,249 @@
       </p:sp>
       <p:pic>
         <p:nvPicPr>
-          <p:cNvPr id="1027" name="Picture 3" descr="C:\Users\belldandy\Downloads\500px-VR_complex.svg.png"/>
+          <p:cNvPr id="6" name="Content Placeholder 5"/>
           <p:cNvPicPr>
-            <a:picLocks noGrp="1" noChangeAspect="1" noChangeArrowheads="1"/>
+            <a:picLocks noGrp="1" noChangeAspect="1"/>
           </p:cNvPicPr>
           <p:nvPr>
             <p:ph idx="1"/>
           </p:nvPr>
         </p:nvPicPr>
         <p:blipFill>
-          <a:blip r:embed="rId3">
+          <a:blip r:embed="rId2" cstate="print">
             <a:extLst>
+              <a:ext uri="{BEBA8EAE-BF5A-486C-A8C5-ECC9F3942E4B}">
+                <a14:imgProps xmlns:a14="http://schemas.microsoft.com/office/drawing/2010/main">
+                  <a14:imgLayer r:embed="rId3">
+                    <a14:imgEffect>
+                      <a14:backgroundRemoval t="10000" b="90000" l="10000" r="90000"/>
+                    </a14:imgEffect>
+                  </a14:imgLayer>
+                </a14:imgProps>
+              </a:ext>
               <a:ext uri="{28A0092B-C50C-407E-A947-70E740481C1C}">
-                <a14:useLocalDpi xmlns:a14="http://schemas.microsoft.com/office/drawing/2010/main" val="0"/>
+                <a14:useLocalDpi xmlns:a14="http://schemas.microsoft.com/office/drawing/2010/main"/>
               </a:ext>
             </a:extLst>
           </a:blip>
-          <a:srcRect/>
+          <a:srcRect t="-146539" b="-146539"/>
           <a:stretch>
             <a:fillRect/>
           </a:stretch>
         </p:blipFill>
-        <p:spPr bwMode="auto">
+        <p:spPr>
           <a:xfrm>
-            <a:off x="1160265" y="1616295"/>
-            <a:ext cx="6169223" cy="4935379"/>
+            <a:off x="431267" y="2698812"/>
+            <a:ext cx="7315200" cy="3540125"/>
+          </a:xfrm>
+        </p:spPr>
+      </p:pic>
+      <p:pic>
+        <p:nvPicPr>
+          <p:cNvPr id="8" name="Picture 7"/>
+          <p:cNvPicPr>
+            <a:picLocks noChangeAspect="1"/>
+          </p:cNvPicPr>
+          <p:nvPr/>
+        </p:nvPicPr>
+        <p:blipFill>
+          <a:blip r:embed="rId4">
+            <a:lum bright="70000" contrast="-70000"/>
+            <a:extLst>
+              <a:ext uri="{BEBA8EAE-BF5A-486C-A8C5-ECC9F3942E4B}">
+                <a14:imgProps xmlns:a14="http://schemas.microsoft.com/office/drawing/2010/main">
+                  <a14:imgLayer r:embed="rId5">
+                    <a14:imgEffect>
+                      <a14:colorTemperature colorTemp="8800"/>
+                    </a14:imgEffect>
+                    <a14:imgEffect>
+                      <a14:saturation sat="33000"/>
+                    </a14:imgEffect>
+                  </a14:imgLayer>
+                </a14:imgProps>
+              </a:ext>
+            </a:extLst>
+          </a:blip>
+          <a:stretch>
+            <a:fillRect/>
+          </a:stretch>
+        </p:blipFill>
+        <p:spPr>
+          <a:xfrm>
+            <a:off x="1453145" y="5155210"/>
+            <a:ext cx="6076461" cy="748107"/>
           </a:xfrm>
           <a:prstGeom prst="rect">
             <a:avLst/>
           </a:prstGeom>
           <a:noFill/>
-          <a:extLst>
-            <a:ext uri="{909E8E84-426E-40DD-AFC4-6F175D3DCCD1}">
-              <a14:hiddenFill xmlns:a14="http://schemas.microsoft.com/office/drawing/2010/main">
-                <a:solidFill>
-                  <a:srgbClr val="FFFFFF"/>
-                </a:solidFill>
-              </a14:hiddenFill>
-            </a:ext>
-          </a:extLst>
+          <a:ln>
+            <a:noFill/>
+          </a:ln>
         </p:spPr>
       </p:pic>
+      <p:pic>
+        <p:nvPicPr>
+          <p:cNvPr id="9" name="Picture 8"/>
+          <p:cNvPicPr>
+            <a:picLocks noChangeAspect="1"/>
+          </p:cNvPicPr>
+          <p:nvPr/>
+        </p:nvPicPr>
+        <p:blipFill>
+          <a:blip r:embed="rId6">
+            <a:lum bright="70000" contrast="-70000"/>
+            <a:extLst>
+              <a:ext uri="{BEBA8EAE-BF5A-486C-A8C5-ECC9F3942E4B}">
+                <a14:imgProps xmlns:a14="http://schemas.microsoft.com/office/drawing/2010/main">
+                  <a14:imgLayer r:embed="rId7">
+                    <a14:imgEffect>
+                      <a14:saturation sat="400000"/>
+                    </a14:imgEffect>
+                  </a14:imgLayer>
+                </a14:imgProps>
+              </a:ext>
+            </a:extLst>
+          </a:blip>
+          <a:stretch>
+            <a:fillRect/>
+          </a:stretch>
+        </p:blipFill>
+        <p:spPr>
+          <a:xfrm>
+            <a:off x="1453145" y="2929798"/>
+            <a:ext cx="4693862" cy="748084"/>
+          </a:xfrm>
+          <a:prstGeom prst="rect">
+            <a:avLst/>
+          </a:prstGeom>
+        </p:spPr>
+      </p:pic>
+      <p:sp>
+        <p:nvSpPr>
+          <p:cNvPr id="10" name="Rectangle 9"/>
+          <p:cNvSpPr/>
+          <p:nvPr/>
+        </p:nvSpPr>
+        <p:spPr>
+          <a:xfrm>
+            <a:off x="1453145" y="3677882"/>
+            <a:ext cx="4572000" cy="1477328"/>
+          </a:xfrm>
+          <a:prstGeom prst="rect">
+            <a:avLst/>
+          </a:prstGeom>
+        </p:spPr>
+        <p:txBody>
+          <a:bodyPr>
+            <a:spAutoFit/>
+          </a:bodyPr>
+          <a:lstStyle/>
+          <a:p>
+            <a:pPr marL="285750" indent="-285750">
+              <a:buFont typeface="Arial"/>
+              <a:buChar char="•"/>
+            </a:pPr>
+            <a:r>
+              <a:rPr lang="en-US" dirty="0"/>
+              <a:t>self-information I(</a:t>
+            </a:r>
+            <a:r>
+              <a:rPr lang="en-US" dirty="0" err="1"/>
+              <a:t>ω</a:t>
+            </a:r>
+            <a:r>
+              <a:rPr lang="en-US" baseline="-25000" dirty="0" err="1"/>
+              <a:t>n</a:t>
+            </a:r>
+            <a:r>
+              <a:rPr lang="en-US" dirty="0"/>
+              <a:t>) associated with outcome </a:t>
+            </a:r>
+            <a:r>
+              <a:rPr lang="en-US" dirty="0" err="1"/>
+              <a:t>ω</a:t>
+            </a:r>
+            <a:r>
+              <a:rPr lang="en-US" baseline="-25000" dirty="0" err="1"/>
+              <a:t>n</a:t>
+            </a:r>
+            <a:r>
+              <a:rPr lang="en-US" dirty="0"/>
+              <a:t> with probability P(</a:t>
+            </a:r>
+            <a:r>
+              <a:rPr lang="en-US" dirty="0" err="1"/>
+              <a:t>ω</a:t>
+            </a:r>
+            <a:r>
+              <a:rPr lang="en-US" baseline="-25000" dirty="0" err="1"/>
+              <a:t>n</a:t>
+            </a:r>
+            <a:r>
+              <a:rPr lang="en-US" dirty="0" smtClean="0"/>
+              <a:t>)</a:t>
+            </a:r>
+          </a:p>
+          <a:p>
+            <a:pPr marL="285750" indent="-285750">
+              <a:buFont typeface="Arial"/>
+              <a:buChar char="•"/>
+            </a:pPr>
+            <a:r>
+              <a:rPr lang="en-US" dirty="0" smtClean="0"/>
+              <a:t>Less likely outcomes will have higher information</a:t>
+            </a:r>
+          </a:p>
+          <a:p>
+            <a:pPr marL="285750" indent="-285750">
+              <a:buFont typeface="Arial"/>
+              <a:buChar char="•"/>
+            </a:pPr>
+            <a:endParaRPr lang="en-US" dirty="0"/>
+          </a:p>
+        </p:txBody>
+      </p:sp>
+      <p:sp>
+        <p:nvSpPr>
+          <p:cNvPr id="11" name="TextBox 10"/>
+          <p:cNvSpPr txBox="1"/>
+          <p:nvPr/>
+        </p:nvSpPr>
+        <p:spPr>
+          <a:xfrm>
+            <a:off x="1364384" y="5777272"/>
+            <a:ext cx="6265673" cy="923330"/>
+          </a:xfrm>
+          <a:prstGeom prst="rect">
+            <a:avLst/>
+          </a:prstGeom>
+          <a:noFill/>
+        </p:spPr>
+        <p:txBody>
+          <a:bodyPr wrap="square" rtlCol="0">
+            <a:spAutoFit/>
+          </a:bodyPr>
+          <a:lstStyle/>
+          <a:p>
+            <a:r>
+              <a:rPr lang="en-US" dirty="0" smtClean="0"/>
+              <a:t>Information in a Partitioning C with P(k) being the probability of picking an element in k</a:t>
+            </a:r>
+          </a:p>
+          <a:p>
+            <a:r>
+              <a:rPr lang="en-US" dirty="0" smtClean="0"/>
+              <a:t>Very similar to Entropy = E(I(X))</a:t>
+            </a:r>
+            <a:endParaRPr lang="en-US" dirty="0"/>
+          </a:p>
+        </p:txBody>
+      </p:sp>
     </p:spTree>
     <p:extLst>
       <p:ext uri="{BB962C8B-B14F-4D97-AF65-F5344CB8AC3E}">
-        <p14:creationId xmlns:p14="http://schemas.microsoft.com/office/powerpoint/2010/main" val="1906748901"/>
+        <p14:creationId xmlns:p14="http://schemas.microsoft.com/office/powerpoint/2010/main" val="4020512038"/>
       </p:ext>
     </p:extLst>
   </p:cSld>
@@ -4474,7 +5798,12 @@
             <p:ph type="title"/>
           </p:nvPr>
         </p:nvSpPr>
-        <p:spPr/>
+        <p:spPr>
+          <a:xfrm>
+            <a:off x="388325" y="1544715"/>
+            <a:ext cx="7841275" cy="1154097"/>
+          </a:xfrm>
+        </p:spPr>
         <p:txBody>
           <a:bodyPr>
             <a:normAutofit fontScale="90000"/>
@@ -4483,35 +5812,268 @@
           <a:p>
             <a:r>
               <a:rPr lang="en-US" dirty="0" smtClean="0"/>
-              <a:t>Sup figure that explains the greedy method to finding a clique</a:t>
+              <a:t>Information stored in a column of P</a:t>
+            </a:r>
+            <a:r>
+              <a:rPr lang="en-US" baseline="-25000" dirty="0" smtClean="0"/>
+              <a:t>M</a:t>
             </a:r>
             <a:endParaRPr lang="en-US" dirty="0"/>
           </a:p>
         </p:txBody>
       </p:sp>
-      <p:sp>
-        <p:nvSpPr>
-          <p:cNvPr id="3" name="Content Placeholder 2"/>
-          <p:cNvSpPr>
-            <a:spLocks noGrp="1"/>
-          </p:cNvSpPr>
+      <p:pic>
+        <p:nvPicPr>
+          <p:cNvPr id="4" name="Content Placeholder 3"/>
+          <p:cNvPicPr>
+            <a:picLocks noGrp="1" noChangeAspect="1"/>
+          </p:cNvPicPr>
           <p:nvPr>
             <p:ph idx="1"/>
           </p:nvPr>
-        </p:nvSpPr>
-        <p:spPr/>
-        <p:txBody>
-          <a:bodyPr/>
-          <a:lstStyle/>
-          <a:p>
-            <a:endParaRPr lang="en-US"/>
+        </p:nvPicPr>
+        <p:blipFill>
+          <a:blip r:embed="rId2" cstate="print">
+            <a:extLst>
+              <a:ext uri="{28A0092B-C50C-407E-A947-70E740481C1C}">
+                <a14:useLocalDpi xmlns:a14="http://schemas.microsoft.com/office/drawing/2010/main"/>
+              </a:ext>
+            </a:extLst>
+          </a:blip>
+          <a:srcRect t="-82217" b="-82217"/>
+          <a:stretch>
+            <a:fillRect/>
+          </a:stretch>
+        </p:blipFill>
+        <p:spPr>
+          <a:xfrm>
+            <a:off x="1763204" y="2431950"/>
+            <a:ext cx="5301421" cy="2565142"/>
+          </a:xfrm>
+        </p:spPr>
+      </p:pic>
+      <p:cxnSp>
+        <p:nvCxnSpPr>
+          <p:cNvPr id="6" name="Straight Arrow Connector 5"/>
+          <p:cNvCxnSpPr>
+            <a:stCxn id="8" idx="0"/>
+          </p:cNvCxnSpPr>
+          <p:nvPr/>
+        </p:nvCxnSpPr>
+        <p:spPr>
+          <a:xfrm flipH="1" flipV="1">
+            <a:off x="6244683" y="3894985"/>
+            <a:ext cx="1007546" cy="1081982"/>
+          </a:xfrm>
+          <a:prstGeom prst="straightConnector1">
+            <a:avLst/>
+          </a:prstGeom>
+          <a:ln>
+            <a:tailEnd type="arrow"/>
+          </a:ln>
+        </p:spPr>
+        <p:style>
+          <a:lnRef idx="2">
+            <a:schemeClr val="accent1"/>
+          </a:lnRef>
+          <a:fillRef idx="0">
+            <a:schemeClr val="accent1"/>
+          </a:fillRef>
+          <a:effectRef idx="1">
+            <a:schemeClr val="accent1"/>
+          </a:effectRef>
+          <a:fontRef idx="minor">
+            <a:schemeClr val="tx1"/>
+          </a:fontRef>
+        </p:style>
+      </p:cxnSp>
+      <p:sp>
+        <p:nvSpPr>
+          <p:cNvPr id="8" name="TextBox 7"/>
+          <p:cNvSpPr txBox="1"/>
+          <p:nvPr/>
+        </p:nvSpPr>
+        <p:spPr>
+          <a:xfrm>
+            <a:off x="5719920" y="4976967"/>
+            <a:ext cx="3064617" cy="646331"/>
+          </a:xfrm>
+          <a:prstGeom prst="rect">
+            <a:avLst/>
+          </a:prstGeom>
+          <a:noFill/>
+        </p:spPr>
+        <p:txBody>
+          <a:bodyPr wrap="square" rtlCol="0">
+            <a:spAutoFit/>
+          </a:bodyPr>
+          <a:lstStyle/>
+          <a:p>
+            <a:r>
+              <a:rPr lang="en-US" dirty="0" smtClean="0"/>
+              <a:t>Log(</a:t>
+            </a:r>
+            <a:r>
+              <a:rPr lang="en-US" dirty="0" err="1" smtClean="0"/>
+              <a:t>p</a:t>
+            </a:r>
+            <a:r>
+              <a:rPr lang="en-US" baseline="-25000" dirty="0" err="1" smtClean="0"/>
+              <a:t>M</a:t>
+            </a:r>
+            <a:r>
+              <a:rPr lang="en-US" dirty="0" smtClean="0"/>
+              <a:t>(</a:t>
+            </a:r>
+            <a:r>
+              <a:rPr lang="en-US" dirty="0" err="1" smtClean="0"/>
+              <a:t>b,i</a:t>
+            </a:r>
+            <a:r>
+              <a:rPr lang="en-US" dirty="0" smtClean="0"/>
+              <a:t>)/q(</a:t>
+            </a:r>
+            <a:r>
+              <a:rPr lang="en-US" dirty="0" err="1" smtClean="0"/>
+              <a:t>i</a:t>
+            </a:r>
+            <a:r>
+              <a:rPr lang="en-US" dirty="0" smtClean="0"/>
+              <a:t>))</a:t>
+            </a:r>
+          </a:p>
+          <a:p>
+            <a:r>
+              <a:rPr lang="en-US" dirty="0" smtClean="0"/>
+              <a:t>More likely = higher value</a:t>
+            </a:r>
+            <a:endParaRPr lang="en-US" dirty="0"/>
+          </a:p>
+        </p:txBody>
+      </p:sp>
+      <p:cxnSp>
+        <p:nvCxnSpPr>
+          <p:cNvPr id="14" name="Straight Arrow Connector 13"/>
+          <p:cNvCxnSpPr>
+            <a:stCxn id="15" idx="0"/>
+          </p:cNvCxnSpPr>
+          <p:nvPr/>
+        </p:nvCxnSpPr>
+        <p:spPr>
+          <a:xfrm flipV="1">
+            <a:off x="3904239" y="3915110"/>
+            <a:ext cx="976059" cy="1081982"/>
+          </a:xfrm>
+          <a:prstGeom prst="straightConnector1">
+            <a:avLst/>
+          </a:prstGeom>
+          <a:ln>
+            <a:tailEnd type="arrow"/>
+          </a:ln>
+        </p:spPr>
+        <p:style>
+          <a:lnRef idx="2">
+            <a:schemeClr val="accent1"/>
+          </a:lnRef>
+          <a:fillRef idx="0">
+            <a:schemeClr val="accent1"/>
+          </a:fillRef>
+          <a:effectRef idx="1">
+            <a:schemeClr val="accent1"/>
+          </a:effectRef>
+          <a:fontRef idx="minor">
+            <a:schemeClr val="tx1"/>
+          </a:fontRef>
+        </p:style>
+      </p:cxnSp>
+      <p:sp>
+        <p:nvSpPr>
+          <p:cNvPr id="15" name="TextBox 14"/>
+          <p:cNvSpPr txBox="1"/>
+          <p:nvPr/>
+        </p:nvSpPr>
+        <p:spPr>
+          <a:xfrm>
+            <a:off x="2088558" y="4997092"/>
+            <a:ext cx="3631362" cy="369332"/>
+          </a:xfrm>
+          <a:prstGeom prst="rect">
+            <a:avLst/>
+          </a:prstGeom>
+          <a:noFill/>
+        </p:spPr>
+        <p:txBody>
+          <a:bodyPr wrap="square" rtlCol="0">
+            <a:spAutoFit/>
+          </a:bodyPr>
+          <a:lstStyle/>
+          <a:p>
+            <a:r>
+              <a:rPr lang="en-US" dirty="0" smtClean="0"/>
+              <a:t>Probability of base b at </a:t>
+            </a:r>
+            <a:r>
+              <a:rPr lang="en-US" dirty="0" err="1" smtClean="0"/>
+              <a:t>pos</a:t>
+            </a:r>
+            <a:r>
+              <a:rPr lang="en-US" dirty="0" smtClean="0"/>
+              <a:t> </a:t>
+            </a:r>
+            <a:r>
+              <a:rPr lang="en-US" dirty="0" err="1" smtClean="0"/>
+              <a:t>i</a:t>
+            </a:r>
+            <a:endParaRPr lang="en-US" dirty="0"/>
+          </a:p>
+        </p:txBody>
+      </p:sp>
+      <p:sp>
+        <p:nvSpPr>
+          <p:cNvPr id="18" name="TextBox 17"/>
+          <p:cNvSpPr txBox="1"/>
+          <p:nvPr/>
+        </p:nvSpPr>
+        <p:spPr>
+          <a:xfrm>
+            <a:off x="852741" y="6020592"/>
+            <a:ext cx="8291259" cy="369332"/>
+          </a:xfrm>
+          <a:prstGeom prst="rect">
+            <a:avLst/>
+          </a:prstGeom>
+          <a:noFill/>
+        </p:spPr>
+        <p:txBody>
+          <a:bodyPr wrap="square" rtlCol="0">
+            <a:spAutoFit/>
+          </a:bodyPr>
+          <a:lstStyle/>
+          <a:p>
+            <a:r>
+              <a:rPr lang="en-US" dirty="0" smtClean="0"/>
+              <a:t>Higher I(I,P</a:t>
+            </a:r>
+            <a:r>
+              <a:rPr lang="en-US" baseline="-25000" dirty="0" smtClean="0"/>
+              <a:t>M</a:t>
+            </a:r>
+            <a:r>
+              <a:rPr lang="en-US" dirty="0" smtClean="0"/>
+              <a:t>) means that we are more confident of the base b at position </a:t>
+            </a:r>
+            <a:r>
+              <a:rPr lang="en-US" dirty="0" err="1" smtClean="0"/>
+              <a:t>i</a:t>
+            </a:r>
+            <a:endParaRPr lang="en-US" dirty="0"/>
           </a:p>
         </p:txBody>
       </p:sp>
     </p:spTree>
     <p:extLst>
       <p:ext uri="{BB962C8B-B14F-4D97-AF65-F5344CB8AC3E}">
-        <p14:creationId xmlns:p14="http://schemas.microsoft.com/office/powerpoint/2010/main" val="1278863060"/>
+        <p14:creationId xmlns:p14="http://schemas.microsoft.com/office/powerpoint/2010/main" val="2589256426"/>
       </p:ext>
     </p:extLst>
   </p:cSld>
@@ -4548,44 +6110,386 @@
             <p:ph type="title"/>
           </p:nvPr>
         </p:nvSpPr>
-        <p:spPr/>
-        <p:txBody>
-          <a:bodyPr>
-            <a:normAutofit/>
+        <p:spPr>
+          <a:xfrm>
+            <a:off x="914400" y="1093375"/>
+            <a:ext cx="7315200" cy="1154097"/>
+          </a:xfrm>
+        </p:spPr>
+        <p:txBody>
+          <a:bodyPr/>
+          <a:lstStyle/>
+          <a:p>
+            <a:r>
+              <a:rPr lang="en-US" dirty="0" smtClean="0"/>
+              <a:t>Similarity</a:t>
+            </a:r>
+            <a:endParaRPr lang="en-US" dirty="0"/>
+          </a:p>
+        </p:txBody>
+      </p:sp>
+      <p:pic>
+        <p:nvPicPr>
+          <p:cNvPr id="4" name="Content Placeholder 3"/>
+          <p:cNvPicPr>
+            <a:picLocks noGrp="1" noChangeAspect="1"/>
+          </p:cNvPicPr>
+          <p:nvPr>
+            <p:ph idx="1"/>
+          </p:nvPr>
+        </p:nvPicPr>
+        <p:blipFill>
+          <a:blip r:embed="rId2" cstate="print">
+            <a:extLst>
+              <a:ext uri="{28A0092B-C50C-407E-A947-70E740481C1C}">
+                <a14:useLocalDpi xmlns:a14="http://schemas.microsoft.com/office/drawing/2010/main"/>
+              </a:ext>
+            </a:extLst>
+          </a:blip>
+          <a:srcRect t="-24673" b="-24673"/>
+          <a:stretch>
+            <a:fillRect/>
+          </a:stretch>
+        </p:blipFill>
+        <p:spPr>
+          <a:xfrm>
+            <a:off x="914400" y="2423456"/>
+            <a:ext cx="7315200" cy="3539527"/>
+          </a:xfrm>
+        </p:spPr>
+      </p:pic>
+      <p:cxnSp>
+        <p:nvCxnSpPr>
+          <p:cNvPr id="6" name="Straight Arrow Connector 5"/>
+          <p:cNvCxnSpPr>
+            <a:stCxn id="13" idx="2"/>
+          </p:cNvCxnSpPr>
+          <p:nvPr/>
+        </p:nvCxnSpPr>
+        <p:spPr>
+          <a:xfrm flipH="1">
+            <a:off x="5310604" y="2674184"/>
+            <a:ext cx="62972" cy="1010007"/>
+          </a:xfrm>
+          <a:prstGeom prst="straightConnector1">
+            <a:avLst/>
+          </a:prstGeom>
+          <a:ln>
+            <a:tailEnd type="arrow"/>
+          </a:ln>
+        </p:spPr>
+        <p:style>
+          <a:lnRef idx="2">
+            <a:schemeClr val="accent1"/>
+          </a:lnRef>
+          <a:fillRef idx="0">
+            <a:schemeClr val="accent1"/>
+          </a:fillRef>
+          <a:effectRef idx="1">
+            <a:schemeClr val="accent1"/>
+          </a:effectRef>
+          <a:fontRef idx="minor">
+            <a:schemeClr val="tx1"/>
+          </a:fontRef>
+        </p:style>
+      </p:cxnSp>
+      <p:cxnSp>
+        <p:nvCxnSpPr>
+          <p:cNvPr id="7" name="Straight Arrow Connector 6"/>
+          <p:cNvCxnSpPr>
+            <a:stCxn id="15" idx="2"/>
+          </p:cNvCxnSpPr>
+          <p:nvPr/>
+        </p:nvCxnSpPr>
+        <p:spPr>
+          <a:xfrm flipH="1">
+            <a:off x="7142247" y="2958595"/>
+            <a:ext cx="482563" cy="725596"/>
+          </a:xfrm>
+          <a:prstGeom prst="straightConnector1">
+            <a:avLst/>
+          </a:prstGeom>
+          <a:ln>
+            <a:tailEnd type="arrow"/>
+          </a:ln>
+        </p:spPr>
+        <p:style>
+          <a:lnRef idx="2">
+            <a:schemeClr val="accent1"/>
+          </a:lnRef>
+          <a:fillRef idx="0">
+            <a:schemeClr val="accent1"/>
+          </a:fillRef>
+          <a:effectRef idx="1">
+            <a:schemeClr val="accent1"/>
+          </a:effectRef>
+          <a:fontRef idx="minor">
+            <a:schemeClr val="tx1"/>
+          </a:fontRef>
+        </p:style>
+      </p:cxnSp>
+      <p:cxnSp>
+        <p:nvCxnSpPr>
+          <p:cNvPr id="8" name="Straight Arrow Connector 7"/>
+          <p:cNvCxnSpPr>
+            <a:stCxn id="9" idx="2"/>
+          </p:cNvCxnSpPr>
+          <p:nvPr/>
+        </p:nvCxnSpPr>
+        <p:spPr>
+          <a:xfrm>
+            <a:off x="3767800" y="2681596"/>
+            <a:ext cx="99925" cy="1002595"/>
+          </a:xfrm>
+          <a:prstGeom prst="straightConnector1">
+            <a:avLst/>
+          </a:prstGeom>
+          <a:ln>
+            <a:tailEnd type="arrow"/>
+          </a:ln>
+        </p:spPr>
+        <p:style>
+          <a:lnRef idx="2">
+            <a:schemeClr val="accent1"/>
+          </a:lnRef>
+          <a:fillRef idx="0">
+            <a:schemeClr val="accent1"/>
+          </a:fillRef>
+          <a:effectRef idx="1">
+            <a:schemeClr val="accent1"/>
+          </a:effectRef>
+          <a:fontRef idx="minor">
+            <a:schemeClr val="tx1"/>
+          </a:fontRef>
+        </p:style>
+      </p:cxnSp>
+      <p:sp>
+        <p:nvSpPr>
+          <p:cNvPr id="9" name="TextBox 8"/>
+          <p:cNvSpPr txBox="1"/>
+          <p:nvPr/>
+        </p:nvSpPr>
+        <p:spPr>
+          <a:xfrm>
+            <a:off x="2970160" y="2312264"/>
+            <a:ext cx="1595280" cy="369332"/>
+          </a:xfrm>
+          <a:prstGeom prst="rect">
+            <a:avLst/>
+          </a:prstGeom>
+          <a:noFill/>
+        </p:spPr>
+        <p:txBody>
+          <a:bodyPr wrap="square" rtlCol="0">
+            <a:spAutoFit/>
           </a:bodyPr>
           <a:lstStyle/>
           <a:p>
             <a:r>
-              <a:rPr lang="en-US" smtClean="0"/>
-              <a:t>Flowchart</a:t>
-            </a:r>
+              <a:rPr lang="en-US" dirty="0" smtClean="0"/>
+              <a:t>Information</a:t>
+            </a:r>
+            <a:endParaRPr lang="en-US" dirty="0"/>
+          </a:p>
+        </p:txBody>
+      </p:sp>
+      <p:sp>
+        <p:nvSpPr>
+          <p:cNvPr id="13" name="TextBox 12"/>
+          <p:cNvSpPr txBox="1"/>
+          <p:nvPr/>
+        </p:nvSpPr>
+        <p:spPr>
+          <a:xfrm>
+            <a:off x="4696631" y="2304852"/>
+            <a:ext cx="1353890" cy="369332"/>
+          </a:xfrm>
+          <a:prstGeom prst="rect">
+            <a:avLst/>
+          </a:prstGeom>
+          <a:noFill/>
+        </p:spPr>
+        <p:txBody>
+          <a:bodyPr wrap="square" rtlCol="0">
+            <a:spAutoFit/>
+          </a:bodyPr>
+          <a:lstStyle/>
+          <a:p>
+            <a:r>
+              <a:rPr lang="en-US" dirty="0" smtClean="0"/>
+              <a:t>frequency</a:t>
+            </a:r>
+            <a:endParaRPr lang="en-US" dirty="0"/>
+          </a:p>
+        </p:txBody>
+      </p:sp>
+      <p:sp>
+        <p:nvSpPr>
+          <p:cNvPr id="15" name="TextBox 14"/>
+          <p:cNvSpPr txBox="1"/>
+          <p:nvPr/>
+        </p:nvSpPr>
+        <p:spPr>
+          <a:xfrm>
+            <a:off x="6612017" y="2312264"/>
+            <a:ext cx="2025586" cy="646331"/>
+          </a:xfrm>
+          <a:prstGeom prst="rect">
+            <a:avLst/>
+          </a:prstGeom>
+          <a:noFill/>
+        </p:spPr>
+        <p:txBody>
+          <a:bodyPr wrap="square" rtlCol="0">
+            <a:spAutoFit/>
+          </a:bodyPr>
+          <a:lstStyle/>
+          <a:p>
+            <a:r>
+              <a:rPr lang="en-US" dirty="0" smtClean="0"/>
+              <a:t>Probability of base b</a:t>
+            </a:r>
+            <a:endParaRPr lang="en-US" dirty="0"/>
+          </a:p>
+        </p:txBody>
+      </p:sp>
+      <p:sp>
+        <p:nvSpPr>
+          <p:cNvPr id="17" name="TextBox 16"/>
+          <p:cNvSpPr txBox="1"/>
+          <p:nvPr/>
+        </p:nvSpPr>
+        <p:spPr>
+          <a:xfrm>
+            <a:off x="3410961" y="5746706"/>
+            <a:ext cx="2865208" cy="646331"/>
+          </a:xfrm>
+          <a:prstGeom prst="rect">
+            <a:avLst/>
+          </a:prstGeom>
+          <a:noFill/>
+        </p:spPr>
+        <p:txBody>
+          <a:bodyPr wrap="square" rtlCol="0">
+            <a:spAutoFit/>
+          </a:bodyPr>
+          <a:lstStyle/>
+          <a:p>
+            <a:r>
+              <a:rPr lang="en-US" dirty="0" smtClean="0"/>
+              <a:t>Upper bound used for normalization</a:t>
+            </a:r>
+            <a:endParaRPr lang="en-US" dirty="0"/>
+          </a:p>
+        </p:txBody>
+      </p:sp>
+      <p:sp>
+        <p:nvSpPr>
+          <p:cNvPr id="20" name="Left Brace 19"/>
+          <p:cNvSpPr/>
+          <p:nvPr/>
+        </p:nvSpPr>
+        <p:spPr>
+          <a:xfrm rot="16200000">
+            <a:off x="4484180" y="3256562"/>
+            <a:ext cx="598303" cy="4444961"/>
+          </a:xfrm>
+          <a:prstGeom prst="leftBrace">
+            <a:avLst/>
+          </a:prstGeom>
+        </p:spPr>
+        <p:style>
+          <a:lnRef idx="2">
+            <a:schemeClr val="accent5"/>
+          </a:lnRef>
+          <a:fillRef idx="0">
+            <a:schemeClr val="accent5"/>
+          </a:fillRef>
+          <a:effectRef idx="1">
+            <a:schemeClr val="accent5"/>
+          </a:effectRef>
+          <a:fontRef idx="minor">
+            <a:schemeClr val="tx1"/>
+          </a:fontRef>
+        </p:style>
+        <p:txBody>
+          <a:bodyPr rtlCol="0" anchor="ctr"/>
+          <a:lstStyle/>
+          <a:p>
+            <a:pPr algn="ctr"/>
             <a:endParaRPr lang="en-US"/>
           </a:p>
         </p:txBody>
       </p:sp>
-      <p:sp>
-        <p:nvSpPr>
-          <p:cNvPr id="3" name="Content Placeholder 2"/>
-          <p:cNvSpPr>
-            <a:spLocks noGrp="1"/>
-          </p:cNvSpPr>
-          <p:nvPr>
-            <p:ph idx="1"/>
-          </p:nvPr>
-        </p:nvSpPr>
-        <p:spPr/>
-        <p:txBody>
-          <a:bodyPr/>
-          <a:lstStyle/>
-          <a:p>
-            <a:endParaRPr lang="en-US"/>
+      <p:cxnSp>
+        <p:nvCxnSpPr>
+          <p:cNvPr id="22" name="Straight Arrow Connector 21"/>
+          <p:cNvCxnSpPr>
+            <a:stCxn id="24" idx="0"/>
+          </p:cNvCxnSpPr>
+          <p:nvPr/>
+        </p:nvCxnSpPr>
+        <p:spPr>
+          <a:xfrm flipV="1">
+            <a:off x="1096755" y="4313967"/>
+            <a:ext cx="687440" cy="1432739"/>
+          </a:xfrm>
+          <a:prstGeom prst="straightConnector1">
+            <a:avLst/>
+          </a:prstGeom>
+          <a:ln>
+            <a:tailEnd type="arrow"/>
+          </a:ln>
+        </p:spPr>
+        <p:style>
+          <a:lnRef idx="2">
+            <a:schemeClr val="accent1"/>
+          </a:lnRef>
+          <a:fillRef idx="0">
+            <a:schemeClr val="accent1"/>
+          </a:fillRef>
+          <a:effectRef idx="1">
+            <a:schemeClr val="accent1"/>
+          </a:effectRef>
+          <a:fontRef idx="minor">
+            <a:schemeClr val="tx1"/>
+          </a:fontRef>
+        </p:style>
+      </p:cxnSp>
+      <p:sp>
+        <p:nvSpPr>
+          <p:cNvPr id="24" name="TextBox 23"/>
+          <p:cNvSpPr txBox="1"/>
+          <p:nvPr/>
+        </p:nvSpPr>
+        <p:spPr>
+          <a:xfrm>
+            <a:off x="209905" y="5746706"/>
+            <a:ext cx="1773700" cy="646331"/>
+          </a:xfrm>
+          <a:prstGeom prst="rect">
+            <a:avLst/>
+          </a:prstGeom>
+          <a:noFill/>
+        </p:spPr>
+        <p:txBody>
+          <a:bodyPr wrap="square" rtlCol="0">
+            <a:spAutoFit/>
+          </a:bodyPr>
+          <a:lstStyle/>
+          <a:p>
+            <a:r>
+              <a:rPr lang="en-US" dirty="0" smtClean="0"/>
+              <a:t>Select optimal alignment</a:t>
+            </a:r>
+            <a:endParaRPr lang="en-US" dirty="0"/>
           </a:p>
         </p:txBody>
       </p:sp>
     </p:spTree>
     <p:extLst>
       <p:ext uri="{BB962C8B-B14F-4D97-AF65-F5344CB8AC3E}">
-        <p14:creationId xmlns:p14="http://schemas.microsoft.com/office/powerpoint/2010/main" val="29402018"/>
+        <p14:creationId xmlns:p14="http://schemas.microsoft.com/office/powerpoint/2010/main" val="3261087481"/>
       </p:ext>
     </p:extLst>
   </p:cSld>

</xml_diff>